<commit_message>
Final presentation, review before submission
</commit_message>
<xml_diff>
--- a/documentation/CMP202 – Data and Algorithms 2.pptx
+++ b/documentation/CMP202 – Data and Algorithms 2.pptx
@@ -13,9 +13,16 @@
     <p:sldId id="261" r:id="rId7"/>
     <p:sldId id="262" r:id="rId8"/>
     <p:sldId id="263" r:id="rId9"/>
-    <p:sldId id="264" r:id="rId10"/>
-    <p:sldId id="266" r:id="rId11"/>
-    <p:sldId id="265" r:id="rId12"/>
+    <p:sldId id="268" r:id="rId10"/>
+    <p:sldId id="264" r:id="rId11"/>
+    <p:sldId id="270" r:id="rId12"/>
+    <p:sldId id="269" r:id="rId13"/>
+    <p:sldId id="272" r:id="rId14"/>
+    <p:sldId id="266" r:id="rId15"/>
+    <p:sldId id="265" r:id="rId16"/>
+    <p:sldId id="271" r:id="rId17"/>
+    <p:sldId id="273" r:id="rId18"/>
+    <p:sldId id="267" r:id="rId19"/>
   </p:sldIdLst>
   <p:sldSz cx="9144000" cy="6858000" type="screen4x3"/>
   <p:notesSz cx="6858000" cy="9144000"/>
@@ -299,7 +306,7 @@
             <a:fld id="{9969052A-A342-4C3F-9772-626B65260072}" type="datetimeFigureOut">
               <a:rPr lang="en-GB" smtClean="0"/>
               <a:pPr/>
-              <a:t>28/04/2018</a:t>
+              <a:t>30/04/2018</a:t>
             </a:fld>
             <a:endParaRPr lang="en-GB"/>
           </a:p>
@@ -466,7 +473,7 @@
             <a:fld id="{9969052A-A342-4C3F-9772-626B65260072}" type="datetimeFigureOut">
               <a:rPr lang="en-GB" smtClean="0"/>
               <a:pPr/>
-              <a:t>28/04/2018</a:t>
+              <a:t>30/04/2018</a:t>
             </a:fld>
             <a:endParaRPr lang="en-GB"/>
           </a:p>
@@ -643,7 +650,7 @@
             <a:fld id="{9969052A-A342-4C3F-9772-626B65260072}" type="datetimeFigureOut">
               <a:rPr lang="en-GB" smtClean="0"/>
               <a:pPr/>
-              <a:t>28/04/2018</a:t>
+              <a:t>30/04/2018</a:t>
             </a:fld>
             <a:endParaRPr lang="en-GB"/>
           </a:p>
@@ -810,7 +817,7 @@
             <a:fld id="{9969052A-A342-4C3F-9772-626B65260072}" type="datetimeFigureOut">
               <a:rPr lang="en-GB" smtClean="0"/>
               <a:pPr/>
-              <a:t>28/04/2018</a:t>
+              <a:t>30/04/2018</a:t>
             </a:fld>
             <a:endParaRPr lang="en-GB"/>
           </a:p>
@@ -1053,7 +1060,7 @@
             <a:fld id="{9969052A-A342-4C3F-9772-626B65260072}" type="datetimeFigureOut">
               <a:rPr lang="en-GB" smtClean="0"/>
               <a:pPr/>
-              <a:t>28/04/2018</a:t>
+              <a:t>30/04/2018</a:t>
             </a:fld>
             <a:endParaRPr lang="en-GB"/>
           </a:p>
@@ -1338,7 +1345,7 @@
             <a:fld id="{9969052A-A342-4C3F-9772-626B65260072}" type="datetimeFigureOut">
               <a:rPr lang="en-GB" smtClean="0"/>
               <a:pPr/>
-              <a:t>28/04/2018</a:t>
+              <a:t>30/04/2018</a:t>
             </a:fld>
             <a:endParaRPr lang="en-GB"/>
           </a:p>
@@ -1757,7 +1764,7 @@
             <a:fld id="{9969052A-A342-4C3F-9772-626B65260072}" type="datetimeFigureOut">
               <a:rPr lang="en-GB" smtClean="0"/>
               <a:pPr/>
-              <a:t>28/04/2018</a:t>
+              <a:t>30/04/2018</a:t>
             </a:fld>
             <a:endParaRPr lang="en-GB"/>
           </a:p>
@@ -1872,7 +1879,7 @@
             <a:fld id="{9969052A-A342-4C3F-9772-626B65260072}" type="datetimeFigureOut">
               <a:rPr lang="en-GB" smtClean="0"/>
               <a:pPr/>
-              <a:t>28/04/2018</a:t>
+              <a:t>30/04/2018</a:t>
             </a:fld>
             <a:endParaRPr lang="en-GB"/>
           </a:p>
@@ -1964,7 +1971,7 @@
             <a:fld id="{9969052A-A342-4C3F-9772-626B65260072}" type="datetimeFigureOut">
               <a:rPr lang="en-GB" smtClean="0"/>
               <a:pPr/>
-              <a:t>28/04/2018</a:t>
+              <a:t>30/04/2018</a:t>
             </a:fld>
             <a:endParaRPr lang="en-GB"/>
           </a:p>
@@ -2238,7 +2245,7 @@
             <a:fld id="{9969052A-A342-4C3F-9772-626B65260072}" type="datetimeFigureOut">
               <a:rPr lang="en-GB" smtClean="0"/>
               <a:pPr/>
-              <a:t>28/04/2018</a:t>
+              <a:t>30/04/2018</a:t>
             </a:fld>
             <a:endParaRPr lang="en-GB"/>
           </a:p>
@@ -2488,7 +2495,7 @@
             <a:fld id="{9969052A-A342-4C3F-9772-626B65260072}" type="datetimeFigureOut">
               <a:rPr lang="en-GB" smtClean="0"/>
               <a:pPr/>
-              <a:t>28/04/2018</a:t>
+              <a:t>30/04/2018</a:t>
             </a:fld>
             <a:endParaRPr lang="en-GB"/>
           </a:p>
@@ -2698,7 +2705,7 @@
             <a:fld id="{9969052A-A342-4C3F-9772-626B65260072}" type="datetimeFigureOut">
               <a:rPr lang="en-GB" smtClean="0"/>
               <a:pPr/>
-              <a:t>28/04/2018</a:t>
+              <a:t>30/04/2018</a:t>
             </a:fld>
             <a:endParaRPr lang="en-GB"/>
           </a:p>
@@ -3293,16 +3300,46 @@
         </p:nvSpPr>
         <p:spPr/>
         <p:txBody>
-          <a:bodyPr/>
-          <a:lstStyle/>
-          <a:p>
-            <a:r>
-              <a:rPr lang="en-GB" dirty="0" smtClean="0"/>
-              <a:t>Expected </a:t>
-            </a:r>
+          <a:bodyPr>
+            <a:normAutofit fontScale="90000"/>
+          </a:bodyPr>
+          <a:lstStyle/>
+          <a:p>
             <a:r>
               <a:rPr lang="en-GB" dirty="0" err="1" smtClean="0"/>
-              <a:t>Perforamce</a:t>
+              <a:t>Pathing</a:t>
+            </a:r>
+            <a:r>
+              <a:rPr lang="en-GB" dirty="0" smtClean="0"/>
+              <a:t> Verses </a:t>
+            </a:r>
+            <a:r>
+              <a:rPr lang="en-GB" dirty="0" smtClean="0"/>
+              <a:t>FPS – </a:t>
+            </a:r>
+            <a:r>
+              <a:rPr lang="en-GB" dirty="0" smtClean="0"/>
+              <a:t>The performance </a:t>
+            </a:r>
+            <a:r>
+              <a:rPr lang="en-GB" dirty="0" err="1" smtClean="0"/>
+              <a:t>vs</a:t>
+            </a:r>
+            <a:r>
+              <a:rPr lang="en-GB" dirty="0" smtClean="0"/>
+              <a:t> </a:t>
+            </a:r>
+            <a:r>
+              <a:rPr lang="en-GB" dirty="0" smtClean="0"/>
+              <a:t>g</a:t>
+            </a:r>
+            <a:r>
+              <a:rPr lang="en-GB" dirty="0" smtClean="0"/>
+              <a:t>ame play </a:t>
+            </a:r>
+            <a:r>
+              <a:rPr lang="en-GB" dirty="0" smtClean="0"/>
+              <a:t>trade-off</a:t>
             </a:r>
             <a:endParaRPr lang="en-GB" dirty="0"/>
           </a:p>
@@ -3310,625 +3347,241 @@
       </p:sp>
       <p:sp>
         <p:nvSpPr>
-          <p:cNvPr id="4" name="Rectangle 3"/>
+          <p:cNvPr id="11" name="TextBox 10"/>
+          <p:cNvSpPr txBox="1"/>
+          <p:nvPr/>
+        </p:nvSpPr>
+        <p:spPr>
+          <a:xfrm>
+            <a:off x="611560" y="1484784"/>
+            <a:ext cx="7776864" cy="584775"/>
+          </a:xfrm>
+          <a:prstGeom prst="rect">
+            <a:avLst/>
+          </a:prstGeom>
+          <a:noFill/>
+        </p:spPr>
+        <p:txBody>
+          <a:bodyPr wrap="square" rtlCol="0">
+            <a:spAutoFit/>
+          </a:bodyPr>
+          <a:lstStyle/>
+          <a:p>
+            <a:pPr>
+              <a:buFont typeface="Arial" pitchFamily="34" charset="0"/>
+              <a:buChar char="•"/>
+            </a:pPr>
+            <a:r>
+              <a:rPr lang="pt-BR" sz="1600" dirty="0" smtClean="0"/>
+              <a:t> Trade off between Units time to getting paths and achieveing the max possible frame rates</a:t>
+            </a:r>
+          </a:p>
+          <a:p>
+            <a:pPr>
+              <a:buFont typeface="Arial" pitchFamily="34" charset="0"/>
+              <a:buChar char="•"/>
+            </a:pPr>
+            <a:r>
+              <a:rPr lang="pt-BR" sz="1600" dirty="0" smtClean="0"/>
+              <a:t> Significant penatlty for relying on one thread for pathfiding but not for updating units</a:t>
+            </a:r>
+          </a:p>
+        </p:txBody>
+      </p:sp>
+      <p:grpSp>
+        <p:nvGrpSpPr>
+          <p:cNvPr id="15" name="Group 14"/>
+          <p:cNvGrpSpPr/>
+          <p:nvPr/>
+        </p:nvGrpSpPr>
+        <p:grpSpPr>
+          <a:xfrm>
+            <a:off x="1259632" y="2204864"/>
+            <a:ext cx="6768752" cy="4196261"/>
+            <a:chOff x="1259632" y="2204864"/>
+            <a:chExt cx="6768752" cy="4196261"/>
+          </a:xfrm>
+        </p:grpSpPr>
+        <p:pic>
+          <p:nvPicPr>
+            <p:cNvPr id="2051" name="Picture 3"/>
+            <p:cNvPicPr>
+              <a:picLocks noChangeAspect="1" noChangeArrowheads="1"/>
+            </p:cNvPicPr>
+            <p:nvPr/>
+          </p:nvPicPr>
+          <p:blipFill>
+            <a:blip r:embed="rId2" cstate="print"/>
+            <a:srcRect/>
+            <a:stretch>
+              <a:fillRect/>
+            </a:stretch>
+          </p:blipFill>
+          <p:spPr bwMode="auto">
+            <a:xfrm>
+              <a:off x="1259632" y="2204864"/>
+              <a:ext cx="6768752" cy="4196261"/>
+            </a:xfrm>
+            <a:prstGeom prst="rect">
+              <a:avLst/>
+            </a:prstGeom>
+            <a:noFill/>
+            <a:ln w="9525">
+              <a:noFill/>
+              <a:miter lim="800000"/>
+              <a:headEnd/>
+              <a:tailEnd/>
+            </a:ln>
+            <a:effectLst/>
+          </p:spPr>
+        </p:pic>
+        <p:sp>
+          <p:nvSpPr>
+            <p:cNvPr id="14" name="Rectangle 13"/>
+            <p:cNvSpPr/>
+            <p:nvPr/>
+          </p:nvSpPr>
+          <p:spPr>
+            <a:xfrm>
+              <a:off x="6300192" y="5229200"/>
+              <a:ext cx="926857" cy="369332"/>
+            </a:xfrm>
+            <a:prstGeom prst="rect">
+              <a:avLst/>
+            </a:prstGeom>
+          </p:spPr>
+          <p:txBody>
+            <a:bodyPr wrap="none">
+              <a:spAutoFit/>
+            </a:bodyPr>
+            <a:lstStyle/>
+            <a:p>
+              <a:r>
+                <a:rPr lang="en-GB" dirty="0" smtClean="0">
+                  <a:solidFill>
+                    <a:srgbClr val="000000"/>
+                  </a:solidFill>
+                </a:rPr>
+                <a:t>3190ms</a:t>
+              </a:r>
+              <a:endParaRPr lang="en-GB" dirty="0"/>
+            </a:p>
+          </p:txBody>
+        </p:sp>
+      </p:grpSp>
+      <p:sp>
+        <p:nvSpPr>
+          <p:cNvPr id="12" name="Rectangle 11"/>
           <p:cNvSpPr/>
           <p:nvPr/>
         </p:nvSpPr>
         <p:spPr>
           <a:xfrm>
-            <a:off x="7884368" y="3284984"/>
-            <a:ext cx="720080" cy="3240360"/>
+            <a:off x="1979712" y="4941168"/>
+            <a:ext cx="3240360" cy="1008112"/>
           </a:xfrm>
           <a:prstGeom prst="rect">
             <a:avLst/>
           </a:prstGeom>
+          <a:noFill/>
+          <a:ln>
+            <a:solidFill>
+              <a:srgbClr val="92D050"/>
+            </a:solidFill>
+          </a:ln>
         </p:spPr>
         <p:style>
           <a:lnRef idx="2">
-            <a:schemeClr val="accent5">
+            <a:schemeClr val="accent1">
               <a:shade val="50000"/>
             </a:schemeClr>
           </a:lnRef>
           <a:fillRef idx="1">
-            <a:schemeClr val="accent5"/>
+            <a:schemeClr val="accent1"/>
           </a:fillRef>
           <a:effectRef idx="0">
-            <a:schemeClr val="accent5"/>
+            <a:schemeClr val="accent1"/>
           </a:effectRef>
           <a:fontRef idx="minor">
             <a:schemeClr val="lt1"/>
           </a:fontRef>
         </p:style>
         <p:txBody>
-          <a:bodyPr vert="horz" rtlCol="0" anchor="ctr"/>
+          <a:bodyPr rtlCol="0" anchor="t"/>
           <a:lstStyle/>
           <a:p>
             <a:pPr algn="ctr"/>
             <a:r>
-              <a:rPr lang="en-GB" dirty="0" smtClean="0"/>
-              <a:t>O(N</a:t>
-            </a:r>
-            <a:r>
-              <a:rPr lang="en-GB" baseline="-25000" dirty="0" smtClean="0"/>
-              <a:t>R</a:t>
-            </a:r>
-            <a:r>
-              <a:rPr lang="en-GB" dirty="0" smtClean="0"/>
-              <a:t>)</a:t>
-            </a:r>
-            <a:endParaRPr lang="en-GB" dirty="0" smtClean="0"/>
-          </a:p>
-          <a:p>
-            <a:pPr algn="ctr"/>
-            <a:endParaRPr lang="en-GB" dirty="0" smtClean="0"/>
-          </a:p>
-          <a:p>
-            <a:pPr algn="ctr"/>
-            <a:endParaRPr lang="en-GB" dirty="0"/>
-          </a:p>
-        </p:txBody>
-      </p:sp>
-      <p:sp>
-        <p:nvSpPr>
-          <p:cNvPr id="5" name="Rectangle 4"/>
+              <a:rPr lang="en-GB" dirty="0" smtClean="0">
+                <a:solidFill>
+                  <a:srgbClr val="92D050"/>
+                </a:solidFill>
+              </a:rPr>
+              <a:t>Acceptable Performance</a:t>
+            </a:r>
+            <a:endParaRPr lang="en-GB" dirty="0">
+              <a:solidFill>
+                <a:srgbClr val="92D050"/>
+              </a:solidFill>
+            </a:endParaRPr>
+          </a:p>
+        </p:txBody>
+      </p:sp>
+      <p:sp>
+        <p:nvSpPr>
+          <p:cNvPr id="13" name="Rectangle 12"/>
           <p:cNvSpPr/>
           <p:nvPr/>
         </p:nvSpPr>
         <p:spPr>
           <a:xfrm>
-            <a:off x="4499992" y="1916832"/>
-            <a:ext cx="2160240" cy="432048"/>
+            <a:off x="4067944" y="2852936"/>
+            <a:ext cx="1296144" cy="720080"/>
           </a:xfrm>
           <a:prstGeom prst="rect">
             <a:avLst/>
           </a:prstGeom>
+          <a:noFill/>
+          <a:ln>
+            <a:solidFill>
+              <a:srgbClr val="92D050"/>
+            </a:solidFill>
+          </a:ln>
         </p:spPr>
         <p:style>
           <a:lnRef idx="2">
-            <a:schemeClr val="accent2">
+            <a:schemeClr val="accent1">
               <a:shade val="50000"/>
             </a:schemeClr>
           </a:lnRef>
           <a:fillRef idx="1">
-            <a:schemeClr val="accent2"/>
+            <a:schemeClr val="accent1"/>
           </a:fillRef>
           <a:effectRef idx="0">
-            <a:schemeClr val="accent2"/>
+            <a:schemeClr val="accent1"/>
           </a:effectRef>
           <a:fontRef idx="minor">
             <a:schemeClr val="lt1"/>
           </a:fontRef>
         </p:style>
         <p:txBody>
-          <a:bodyPr rtlCol="0" anchor="ctr"/>
+          <a:bodyPr rtlCol="0" anchor="t"/>
           <a:lstStyle/>
           <a:p>
             <a:pPr algn="ctr"/>
             <a:r>
-              <a:rPr lang="en-GB" dirty="0" smtClean="0"/>
-              <a:t>Main Thread</a:t>
-            </a:r>
-            <a:endParaRPr lang="en-GB" dirty="0"/>
-          </a:p>
-        </p:txBody>
-      </p:sp>
-      <p:sp>
-        <p:nvSpPr>
-          <p:cNvPr id="6" name="Rectangle 5"/>
-          <p:cNvSpPr/>
-          <p:nvPr/>
-        </p:nvSpPr>
-        <p:spPr>
-          <a:xfrm>
-            <a:off x="4499992" y="2420888"/>
-            <a:ext cx="2160240" cy="432048"/>
-          </a:xfrm>
-          <a:prstGeom prst="rect">
-            <a:avLst/>
-          </a:prstGeom>
-        </p:spPr>
-        <p:style>
-          <a:lnRef idx="2">
-            <a:schemeClr val="accent4">
-              <a:shade val="50000"/>
-            </a:schemeClr>
-          </a:lnRef>
-          <a:fillRef idx="1">
-            <a:schemeClr val="accent4"/>
-          </a:fillRef>
-          <a:effectRef idx="0">
-            <a:schemeClr val="accent4"/>
-          </a:effectRef>
-          <a:fontRef idx="minor">
-            <a:schemeClr val="lt1"/>
-          </a:fontRef>
-        </p:style>
-        <p:txBody>
-          <a:bodyPr rtlCol="0" anchor="ctr"/>
-          <a:lstStyle/>
-          <a:p>
-            <a:pPr algn="ctr"/>
-            <a:r>
-              <a:rPr lang="en-GB" dirty="0" smtClean="0"/>
-              <a:t>Render Thread</a:t>
-            </a:r>
-            <a:endParaRPr lang="en-GB" dirty="0"/>
-          </a:p>
-        </p:txBody>
-      </p:sp>
-      <p:sp>
-        <p:nvSpPr>
-          <p:cNvPr id="7" name="Rectangle 6"/>
-          <p:cNvSpPr/>
-          <p:nvPr/>
-        </p:nvSpPr>
-        <p:spPr>
-          <a:xfrm>
-            <a:off x="6732240" y="2420888"/>
-            <a:ext cx="2160240" cy="432048"/>
-          </a:xfrm>
-          <a:prstGeom prst="rect">
-            <a:avLst/>
-          </a:prstGeom>
-        </p:spPr>
-        <p:style>
-          <a:lnRef idx="2">
-            <a:schemeClr val="accent6">
-              <a:shade val="50000"/>
-            </a:schemeClr>
-          </a:lnRef>
-          <a:fillRef idx="1">
-            <a:schemeClr val="accent6"/>
-          </a:fillRef>
-          <a:effectRef idx="0">
-            <a:schemeClr val="accent6"/>
-          </a:effectRef>
-          <a:fontRef idx="minor">
-            <a:schemeClr val="lt1"/>
-          </a:fontRef>
-        </p:style>
-        <p:txBody>
-          <a:bodyPr rtlCol="0" anchor="ctr"/>
-          <a:lstStyle/>
-          <a:p>
-            <a:pPr algn="ctr"/>
-            <a:r>
-              <a:rPr lang="en-GB" dirty="0" err="1" smtClean="0"/>
-              <a:t>GameObject</a:t>
-            </a:r>
-            <a:r>
-              <a:rPr lang="en-GB" dirty="0" smtClean="0"/>
-              <a:t> Threads</a:t>
-            </a:r>
-            <a:endParaRPr lang="en-GB" dirty="0"/>
-          </a:p>
-        </p:txBody>
-      </p:sp>
-      <p:sp>
-        <p:nvSpPr>
-          <p:cNvPr id="8" name="Rectangle 7"/>
-          <p:cNvSpPr/>
-          <p:nvPr/>
-        </p:nvSpPr>
-        <p:spPr>
-          <a:xfrm>
-            <a:off x="5220072" y="3861048"/>
-            <a:ext cx="2520280" cy="432048"/>
-          </a:xfrm>
-          <a:prstGeom prst="rect">
-            <a:avLst/>
-          </a:prstGeom>
-        </p:spPr>
-        <p:style>
-          <a:lnRef idx="2">
-            <a:schemeClr val="dk1">
-              <a:shade val="50000"/>
-            </a:schemeClr>
-          </a:lnRef>
-          <a:fillRef idx="1">
-            <a:schemeClr val="dk1"/>
-          </a:fillRef>
-          <a:effectRef idx="0">
-            <a:schemeClr val="dk1"/>
-          </a:effectRef>
-          <a:fontRef idx="minor">
-            <a:schemeClr val="lt1"/>
-          </a:fontRef>
-        </p:style>
-        <p:txBody>
-          <a:bodyPr rtlCol="0" anchor="ctr"/>
-          <a:lstStyle/>
-          <a:p>
-            <a:pPr algn="ctr"/>
-            <a:r>
-              <a:rPr lang="en-GB" dirty="0" smtClean="0"/>
-              <a:t>Process Barrier</a:t>
-            </a:r>
-            <a:endParaRPr lang="en-GB" dirty="0"/>
-          </a:p>
-        </p:txBody>
-      </p:sp>
-      <p:sp>
-        <p:nvSpPr>
-          <p:cNvPr id="9" name="Rectangle 8"/>
-          <p:cNvSpPr/>
-          <p:nvPr/>
-        </p:nvSpPr>
-        <p:spPr>
-          <a:xfrm>
-            <a:off x="5220072" y="4941168"/>
-            <a:ext cx="2520280" cy="432048"/>
-          </a:xfrm>
-          <a:prstGeom prst="rect">
-            <a:avLst/>
-          </a:prstGeom>
-        </p:spPr>
-        <p:style>
-          <a:lnRef idx="2">
-            <a:schemeClr val="dk1">
-              <a:shade val="50000"/>
-            </a:schemeClr>
-          </a:lnRef>
-          <a:fillRef idx="1">
-            <a:schemeClr val="dk1"/>
-          </a:fillRef>
-          <a:effectRef idx="0">
-            <a:schemeClr val="dk1"/>
-          </a:effectRef>
-          <a:fontRef idx="minor">
-            <a:schemeClr val="lt1"/>
-          </a:fontRef>
-        </p:style>
-        <p:txBody>
-          <a:bodyPr rtlCol="0" anchor="ctr"/>
-          <a:lstStyle/>
-          <a:p>
-            <a:pPr algn="ctr"/>
-            <a:r>
-              <a:rPr lang="en-GB" dirty="0" smtClean="0"/>
-              <a:t>Render Barrier</a:t>
-            </a:r>
-            <a:endParaRPr lang="en-GB" dirty="0"/>
-          </a:p>
-        </p:txBody>
-      </p:sp>
-      <p:sp>
-        <p:nvSpPr>
-          <p:cNvPr id="10" name="Rectangle 9"/>
-          <p:cNvSpPr/>
-          <p:nvPr/>
-        </p:nvSpPr>
-        <p:spPr>
-          <a:xfrm>
-            <a:off x="5220072" y="6093296"/>
-            <a:ext cx="2520280" cy="432048"/>
-          </a:xfrm>
-          <a:prstGeom prst="rect">
-            <a:avLst/>
-          </a:prstGeom>
-        </p:spPr>
-        <p:style>
-          <a:lnRef idx="2">
-            <a:schemeClr val="dk1">
-              <a:shade val="50000"/>
-            </a:schemeClr>
-          </a:lnRef>
-          <a:fillRef idx="1">
-            <a:schemeClr val="dk1"/>
-          </a:fillRef>
-          <a:effectRef idx="0">
-            <a:schemeClr val="dk1"/>
-          </a:effectRef>
-          <a:fontRef idx="minor">
-            <a:schemeClr val="lt1"/>
-          </a:fontRef>
-        </p:style>
-        <p:txBody>
-          <a:bodyPr rtlCol="0" anchor="ctr"/>
-          <a:lstStyle/>
-          <a:p>
-            <a:pPr algn="ctr"/>
-            <a:r>
-              <a:rPr lang="en-GB" dirty="0" smtClean="0"/>
-              <a:t>End Frame Barrier</a:t>
-            </a:r>
-            <a:endParaRPr lang="en-GB" dirty="0"/>
-          </a:p>
-        </p:txBody>
-      </p:sp>
-      <p:sp>
-        <p:nvSpPr>
-          <p:cNvPr id="11" name="Rectangle 10"/>
-          <p:cNvSpPr/>
-          <p:nvPr/>
-        </p:nvSpPr>
-        <p:spPr>
-          <a:xfrm>
-            <a:off x="6732240" y="1916832"/>
-            <a:ext cx="2160240" cy="432048"/>
-          </a:xfrm>
-          <a:prstGeom prst="rect">
-            <a:avLst/>
-          </a:prstGeom>
-        </p:spPr>
-        <p:style>
-          <a:lnRef idx="2">
-            <a:schemeClr val="accent5">
-              <a:shade val="50000"/>
-            </a:schemeClr>
-          </a:lnRef>
-          <a:fillRef idx="1">
-            <a:schemeClr val="accent5"/>
-          </a:fillRef>
-          <a:effectRef idx="0">
-            <a:schemeClr val="accent5"/>
-          </a:effectRef>
-          <a:fontRef idx="minor">
-            <a:schemeClr val="lt1"/>
-          </a:fontRef>
-        </p:style>
-        <p:txBody>
-          <a:bodyPr rtlCol="0" anchor="ctr"/>
-          <a:lstStyle/>
-          <a:p>
-            <a:pPr algn="ctr"/>
-            <a:r>
-              <a:rPr lang="en-GB" dirty="0" smtClean="0"/>
-              <a:t>Path Finding Threads</a:t>
-            </a:r>
-            <a:endParaRPr lang="en-GB" dirty="0"/>
-          </a:p>
-        </p:txBody>
-      </p:sp>
-      <p:sp>
-        <p:nvSpPr>
-          <p:cNvPr id="12" name="Rectangle 11"/>
-          <p:cNvSpPr/>
-          <p:nvPr/>
-        </p:nvSpPr>
-        <p:spPr>
-          <a:xfrm>
-            <a:off x="5220072" y="3284984"/>
-            <a:ext cx="1224136" cy="432048"/>
-          </a:xfrm>
-          <a:prstGeom prst="rect">
-            <a:avLst/>
-          </a:prstGeom>
-        </p:spPr>
-        <p:style>
-          <a:lnRef idx="2">
-            <a:schemeClr val="accent2">
-              <a:shade val="50000"/>
-            </a:schemeClr>
-          </a:lnRef>
-          <a:fillRef idx="1">
-            <a:schemeClr val="accent2"/>
-          </a:fillRef>
-          <a:effectRef idx="0">
-            <a:schemeClr val="accent2"/>
-          </a:effectRef>
-          <a:fontRef idx="minor">
-            <a:schemeClr val="lt1"/>
-          </a:fontRef>
-        </p:style>
-        <p:txBody>
-          <a:bodyPr rtlCol="0" anchor="ctr"/>
-          <a:lstStyle/>
-          <a:p>
-            <a:pPr algn="ctr"/>
-            <a:r>
-              <a:rPr lang="en-GB" dirty="0" smtClean="0"/>
-              <a:t>O(</a:t>
-            </a:r>
-            <a:r>
-              <a:rPr lang="en-GB" dirty="0" err="1" smtClean="0"/>
-              <a:t>N</a:t>
-            </a:r>
-            <a:r>
-              <a:rPr lang="en-GB" baseline="-25000" dirty="0" err="1" smtClean="0"/>
-              <a:t>u</a:t>
-            </a:r>
-            <a:r>
-              <a:rPr lang="en-GB" dirty="0" err="1" smtClean="0"/>
-              <a:t>+N</a:t>
-            </a:r>
-            <a:r>
-              <a:rPr lang="en-GB" baseline="-25000" dirty="0" err="1" smtClean="0"/>
-              <a:t>p</a:t>
-            </a:r>
-            <a:r>
-              <a:rPr lang="en-GB" dirty="0" smtClean="0"/>
-              <a:t>)</a:t>
-            </a:r>
-            <a:endParaRPr lang="en-GB" dirty="0"/>
-          </a:p>
-        </p:txBody>
-      </p:sp>
-      <p:sp>
-        <p:nvSpPr>
-          <p:cNvPr id="13" name="Rectangle 12"/>
-          <p:cNvSpPr/>
-          <p:nvPr/>
-        </p:nvSpPr>
-        <p:spPr>
-          <a:xfrm>
-            <a:off x="6588224" y="3284984"/>
-            <a:ext cx="1152128" cy="432048"/>
-          </a:xfrm>
-          <a:prstGeom prst="rect">
-            <a:avLst/>
-          </a:prstGeom>
-        </p:spPr>
-        <p:style>
-          <a:lnRef idx="2">
-            <a:schemeClr val="accent4">
-              <a:shade val="50000"/>
-            </a:schemeClr>
-          </a:lnRef>
-          <a:fillRef idx="1">
-            <a:schemeClr val="accent4"/>
-          </a:fillRef>
-          <a:effectRef idx="0">
-            <a:schemeClr val="accent4"/>
-          </a:effectRef>
-          <a:fontRef idx="minor">
-            <a:schemeClr val="lt1"/>
-          </a:fontRef>
-        </p:style>
-        <p:txBody>
-          <a:bodyPr rtlCol="0" anchor="ctr"/>
-          <a:lstStyle/>
-          <a:p>
-            <a:pPr algn="ctr"/>
-            <a:r>
-              <a:rPr lang="en-GB" dirty="0" smtClean="0"/>
-              <a:t>O(N</a:t>
-            </a:r>
-            <a:r>
-              <a:rPr lang="en-GB" baseline="-25000" dirty="0" smtClean="0"/>
-              <a:t>T</a:t>
-            </a:r>
-            <a:r>
-              <a:rPr lang="en-GB" dirty="0" smtClean="0"/>
-              <a:t>)</a:t>
-            </a:r>
-            <a:endParaRPr lang="en-GB" dirty="0"/>
-          </a:p>
-        </p:txBody>
-      </p:sp>
-      <p:sp>
-        <p:nvSpPr>
-          <p:cNvPr id="14" name="Rectangle 13"/>
-          <p:cNvSpPr/>
-          <p:nvPr/>
-        </p:nvSpPr>
-        <p:spPr>
-          <a:xfrm>
-            <a:off x="5220072" y="4365104"/>
-            <a:ext cx="2520280" cy="432048"/>
-          </a:xfrm>
-          <a:prstGeom prst="rect">
-            <a:avLst/>
-          </a:prstGeom>
-        </p:spPr>
-        <p:style>
-          <a:lnRef idx="2">
-            <a:schemeClr val="accent6">
-              <a:shade val="50000"/>
-            </a:schemeClr>
-          </a:lnRef>
-          <a:fillRef idx="1">
-            <a:schemeClr val="accent6"/>
-          </a:fillRef>
-          <a:effectRef idx="0">
-            <a:schemeClr val="accent6"/>
-          </a:effectRef>
-          <a:fontRef idx="minor">
-            <a:schemeClr val="lt1"/>
-          </a:fontRef>
-        </p:style>
-        <p:txBody>
-          <a:bodyPr rtlCol="0" anchor="ctr"/>
-          <a:lstStyle/>
-          <a:p>
-            <a:pPr algn="ctr"/>
-            <a:r>
-              <a:rPr lang="en-GB" dirty="0" smtClean="0"/>
-              <a:t>O(N</a:t>
-            </a:r>
-            <a:r>
-              <a:rPr lang="en-GB" baseline="-25000" dirty="0" smtClean="0"/>
-              <a:t>u </a:t>
-            </a:r>
-            <a:r>
-              <a:rPr lang="en-GB" dirty="0" smtClean="0"/>
-              <a:t>+</a:t>
-            </a:r>
-            <a:r>
-              <a:rPr lang="en-GB" dirty="0" err="1" smtClean="0"/>
-              <a:t>N</a:t>
-            </a:r>
-            <a:r>
-              <a:rPr lang="en-GB" baseline="-25000" dirty="0" err="1" smtClean="0"/>
-              <a:t>p</a:t>
-            </a:r>
-            <a:r>
-              <a:rPr lang="en-GB" dirty="0" smtClean="0"/>
-              <a:t>)</a:t>
-            </a:r>
-            <a:endParaRPr lang="en-GB" dirty="0"/>
-          </a:p>
-        </p:txBody>
-      </p:sp>
-      <p:sp>
-        <p:nvSpPr>
-          <p:cNvPr id="16" name="Rectangle 15"/>
-          <p:cNvSpPr/>
-          <p:nvPr/>
-        </p:nvSpPr>
-        <p:spPr>
-          <a:xfrm>
-            <a:off x="5220072" y="5517232"/>
-            <a:ext cx="2520280" cy="432048"/>
-          </a:xfrm>
-          <a:prstGeom prst="rect">
-            <a:avLst/>
-          </a:prstGeom>
-        </p:spPr>
-        <p:style>
-          <a:lnRef idx="2">
-            <a:schemeClr val="accent4">
-              <a:shade val="50000"/>
-            </a:schemeClr>
-          </a:lnRef>
-          <a:fillRef idx="1">
-            <a:schemeClr val="accent4"/>
-          </a:fillRef>
-          <a:effectRef idx="0">
-            <a:schemeClr val="accent4"/>
-          </a:effectRef>
-          <a:fontRef idx="minor">
-            <a:schemeClr val="lt1"/>
-          </a:fontRef>
-        </p:style>
-        <p:txBody>
-          <a:bodyPr rtlCol="0" anchor="ctr"/>
-          <a:lstStyle/>
-          <a:p>
-            <a:pPr algn="ctr"/>
-            <a:r>
-              <a:rPr lang="en-GB" dirty="0" smtClean="0"/>
-              <a:t>O(</a:t>
-            </a:r>
-            <a:r>
-              <a:rPr lang="en-GB" dirty="0" err="1" smtClean="0"/>
-              <a:t>N</a:t>
-            </a:r>
-            <a:r>
-              <a:rPr lang="en-GB" baseline="-25000" dirty="0" err="1" smtClean="0"/>
-              <a:t>u</a:t>
-            </a:r>
-            <a:r>
-              <a:rPr lang="en-GB" dirty="0" err="1" smtClean="0"/>
-              <a:t>+N</a:t>
-            </a:r>
-            <a:r>
-              <a:rPr lang="en-GB" baseline="-25000" dirty="0" err="1" smtClean="0"/>
-              <a:t>p</a:t>
-            </a:r>
-            <a:r>
-              <a:rPr lang="en-GB" dirty="0" err="1" smtClean="0"/>
-              <a:t>+N</a:t>
-            </a:r>
-            <a:r>
-              <a:rPr lang="en-GB" baseline="-25000" dirty="0" err="1" smtClean="0"/>
-              <a:t>T</a:t>
-            </a:r>
-            <a:r>
-              <a:rPr lang="en-GB" dirty="0" smtClean="0"/>
-              <a:t>)</a:t>
-            </a:r>
-            <a:endParaRPr lang="en-GB" dirty="0"/>
+              <a:rPr lang="en-GB" sz="1200" dirty="0" smtClean="0">
+                <a:solidFill>
+                  <a:srgbClr val="92D050"/>
+                </a:solidFill>
+              </a:rPr>
+              <a:t>Best Performance</a:t>
+            </a:r>
+            <a:endParaRPr lang="en-GB" sz="1200" dirty="0">
+              <a:solidFill>
+                <a:srgbClr val="92D050"/>
+              </a:solidFill>
+            </a:endParaRPr>
           </a:p>
         </p:txBody>
       </p:sp>
@@ -3937,6 +3590,13 @@
   <p:clrMapOvr>
     <a:masterClrMapping/>
   </p:clrMapOvr>
+  <p:timing>
+    <p:tnLst>
+      <p:par>
+        <p:cTn id="1" dur="indefinite" restart="never" nodeType="tmRoot"/>
+      </p:par>
+    </p:tnLst>
+  </p:timing>
 </p:sld>
 </file>
 
@@ -3969,12 +3629,30 @@
         </p:nvSpPr>
         <p:spPr/>
         <p:txBody>
-          <a:bodyPr/>
-          <a:lstStyle/>
-          <a:p>
-            <a:r>
-              <a:rPr lang="en-GB" dirty="0" smtClean="0"/>
-              <a:t>How well does this perform?</a:t>
+          <a:bodyPr>
+            <a:normAutofit fontScale="90000"/>
+          </a:bodyPr>
+          <a:lstStyle/>
+          <a:p>
+            <a:r>
+              <a:rPr lang="en-GB" dirty="0" err="1" smtClean="0"/>
+              <a:t>Pathing</a:t>
+            </a:r>
+            <a:r>
+              <a:rPr lang="en-GB" dirty="0" smtClean="0"/>
+              <a:t> Verses FPS – The performance </a:t>
+            </a:r>
+            <a:r>
+              <a:rPr lang="en-GB" dirty="0" err="1" smtClean="0"/>
+              <a:t>vs</a:t>
+            </a:r>
+            <a:r>
+              <a:rPr lang="en-GB" dirty="0" smtClean="0"/>
+              <a:t> game play </a:t>
+            </a:r>
+            <a:r>
+              <a:rPr lang="en-GB" dirty="0" smtClean="0"/>
+              <a:t>trade-off 2</a:t>
             </a:r>
             <a:endParaRPr lang="en-GB" dirty="0"/>
           </a:p>
@@ -3982,7 +3660,7 @@
       </p:sp>
       <p:pic>
         <p:nvPicPr>
-          <p:cNvPr id="1026" name="Picture 2"/>
+          <p:cNvPr id="3076" name="Picture 4"/>
           <p:cNvPicPr>
             <a:picLocks noGrp="1" noChangeAspect="1" noChangeArrowheads="1"/>
           </p:cNvPicPr>
@@ -3999,8 +3677,8 @@
         </p:blipFill>
         <p:spPr bwMode="auto">
           <a:xfrm>
-            <a:off x="1475656" y="2060848"/>
-            <a:ext cx="6303958" cy="3579518"/>
+            <a:off x="577649" y="1600200"/>
+            <a:ext cx="7988702" cy="4525963"/>
           </a:xfrm>
           <a:prstGeom prst="rect">
             <a:avLst/>
@@ -4015,18 +3693,126 @@
           <a:effectLst/>
         </p:spPr>
       </p:pic>
-      <p:sp>
-        <p:nvSpPr>
-          <p:cNvPr id="5" name="Oval 4"/>
+    </p:spTree>
+  </p:cSld>
+  <p:clrMapOvr>
+    <a:masterClrMapping/>
+  </p:clrMapOvr>
+  <p:timing>
+    <p:tnLst>
+      <p:par>
+        <p:cTn id="1" dur="indefinite" restart="never" nodeType="tmRoot"/>
+      </p:par>
+    </p:tnLst>
+  </p:timing>
+</p:sld>
+</file>
+
+<file path=ppt/slides/slide12.xml><?xml version="1.0" encoding="utf-8"?>
+<p:sld xmlns:a="http://schemas.openxmlformats.org/drawingml/2006/main" xmlns:r="http://schemas.openxmlformats.org/officeDocument/2006/relationships" xmlns:p="http://schemas.openxmlformats.org/presentationml/2006/main">
+  <p:cSld>
+    <p:spTree>
+      <p:nvGrpSpPr>
+        <p:cNvPr id="1" name=""/>
+        <p:cNvGrpSpPr/>
+        <p:nvPr/>
+      </p:nvGrpSpPr>
+      <p:grpSpPr>
+        <a:xfrm>
+          <a:off x="0" y="0"/>
+          <a:ext cx="0" cy="0"/>
+          <a:chOff x="0" y="0"/>
+          <a:chExt cx="0" cy="0"/>
+        </a:xfrm>
+      </p:grpSpPr>
+      <p:sp>
+        <p:nvSpPr>
+          <p:cNvPr id="2" name="Title 1"/>
+          <p:cNvSpPr>
+            <a:spLocks noGrp="1"/>
+          </p:cNvSpPr>
+          <p:nvPr>
+            <p:ph type="title"/>
+          </p:nvPr>
+        </p:nvSpPr>
+        <p:spPr/>
+        <p:txBody>
+          <a:bodyPr>
+            <a:normAutofit fontScale="90000"/>
+          </a:bodyPr>
+          <a:lstStyle/>
+          <a:p>
+            <a:r>
+              <a:rPr lang="en-GB" dirty="0" err="1" smtClean="0"/>
+              <a:t>Pathing</a:t>
+            </a:r>
+            <a:r>
+              <a:rPr lang="en-GB" dirty="0" smtClean="0"/>
+              <a:t> Verses FPS – The performance </a:t>
+            </a:r>
+            <a:r>
+              <a:rPr lang="en-GB" dirty="0" err="1" smtClean="0"/>
+              <a:t>vs</a:t>
+            </a:r>
+            <a:r>
+              <a:rPr lang="en-GB" dirty="0" smtClean="0"/>
+              <a:t> game play </a:t>
+            </a:r>
+            <a:r>
+              <a:rPr lang="en-GB" dirty="0" smtClean="0"/>
+              <a:t>trade-off 3</a:t>
+            </a:r>
+            <a:endParaRPr lang="en-GB" dirty="0"/>
+          </a:p>
+        </p:txBody>
+      </p:sp>
+      <p:pic>
+        <p:nvPicPr>
+          <p:cNvPr id="2051" name="Picture 3"/>
+          <p:cNvPicPr>
+            <a:picLocks noGrp="1" noChangeAspect="1" noChangeArrowheads="1"/>
+          </p:cNvPicPr>
+          <p:nvPr>
+            <p:ph idx="1"/>
+          </p:nvPr>
+        </p:nvPicPr>
+        <p:blipFill>
+          <a:blip r:embed="rId2" cstate="print"/>
+          <a:srcRect/>
+          <a:stretch>
+            <a:fillRect/>
+          </a:stretch>
+        </p:blipFill>
+        <p:spPr bwMode="auto">
+          <a:xfrm>
+            <a:off x="520857" y="1939727"/>
+            <a:ext cx="8102286" cy="3846909"/>
+          </a:xfrm>
+          <a:prstGeom prst="rect">
+            <a:avLst/>
+          </a:prstGeom>
+          <a:noFill/>
+          <a:ln w="9525">
+            <a:noFill/>
+            <a:miter lim="800000"/>
+            <a:headEnd/>
+            <a:tailEnd/>
+          </a:ln>
+          <a:effectLst/>
+        </p:spPr>
+      </p:pic>
+      <p:sp>
+        <p:nvSpPr>
+          <p:cNvPr id="11" name="Rectangle 10"/>
           <p:cNvSpPr/>
           <p:nvPr/>
         </p:nvSpPr>
         <p:spPr>
           <a:xfrm>
-            <a:off x="4211960" y="2708920"/>
-            <a:ext cx="2448272" cy="360040"/>
-          </a:xfrm>
-          <a:prstGeom prst="ellipse">
+            <a:off x="4139952" y="2420888"/>
+            <a:ext cx="1296144" cy="3024336"/>
+          </a:xfrm>
+          <a:prstGeom prst="rect">
             <a:avLst/>
           </a:prstGeom>
           <a:noFill/>
@@ -4057,20 +3843,1433 @@
           <a:lstStyle/>
           <a:p>
             <a:pPr algn="ctr"/>
-            <a:endParaRPr lang="en-GB"/>
+            <a:endParaRPr lang="en-GB">
+              <a:ln>
+                <a:solidFill>
+                  <a:srgbClr val="FF0000"/>
+                </a:solidFill>
+              </a:ln>
+            </a:endParaRPr>
+          </a:p>
+        </p:txBody>
+      </p:sp>
+    </p:spTree>
+  </p:cSld>
+  <p:clrMapOvr>
+    <a:masterClrMapping/>
+  </p:clrMapOvr>
+  <p:timing>
+    <p:tnLst>
+      <p:par>
+        <p:cTn id="1" dur="indefinite" restart="never" nodeType="tmRoot"/>
+      </p:par>
+    </p:tnLst>
+  </p:timing>
+</p:sld>
+</file>
+
+<file path=ppt/slides/slide13.xml><?xml version="1.0" encoding="utf-8"?>
+<p:sld xmlns:a="http://schemas.openxmlformats.org/drawingml/2006/main" xmlns:r="http://schemas.openxmlformats.org/officeDocument/2006/relationships" xmlns:p="http://schemas.openxmlformats.org/presentationml/2006/main">
+  <p:cSld>
+    <p:spTree>
+      <p:nvGrpSpPr>
+        <p:cNvPr id="1" name=""/>
+        <p:cNvGrpSpPr/>
+        <p:nvPr/>
+      </p:nvGrpSpPr>
+      <p:grpSpPr>
+        <a:xfrm>
+          <a:off x="0" y="0"/>
+          <a:ext cx="0" cy="0"/>
+          <a:chOff x="0" y="0"/>
+          <a:chExt cx="0" cy="0"/>
+        </a:xfrm>
+      </p:grpSpPr>
+      <p:sp>
+        <p:nvSpPr>
+          <p:cNvPr id="2" name="Title 1"/>
+          <p:cNvSpPr>
+            <a:spLocks noGrp="1"/>
+          </p:cNvSpPr>
+          <p:nvPr>
+            <p:ph type="title"/>
+          </p:nvPr>
+        </p:nvSpPr>
+        <p:spPr/>
+        <p:txBody>
+          <a:bodyPr>
+            <a:normAutofit fontScale="90000"/>
+          </a:bodyPr>
+          <a:lstStyle/>
+          <a:p>
+            <a:r>
+              <a:rPr lang="en-GB" dirty="0" smtClean="0"/>
+              <a:t>Expected Performance With Changing Unit </a:t>
+            </a:r>
+            <a:r>
+              <a:rPr lang="en-GB" dirty="0" smtClean="0"/>
+              <a:t>Numbers 1</a:t>
+            </a:r>
+            <a:endParaRPr lang="en-GB" dirty="0"/>
+          </a:p>
+        </p:txBody>
+      </p:sp>
+      <p:pic>
+        <p:nvPicPr>
+          <p:cNvPr id="29698" name="Picture 2"/>
+          <p:cNvPicPr>
+            <a:picLocks noGrp="1" noChangeAspect="1" noChangeArrowheads="1"/>
+          </p:cNvPicPr>
+          <p:nvPr>
+            <p:ph idx="1"/>
+          </p:nvPr>
+        </p:nvPicPr>
+        <p:blipFill>
+          <a:blip r:embed="rId2" cstate="print"/>
+          <a:srcRect/>
+          <a:stretch>
+            <a:fillRect/>
+          </a:stretch>
+        </p:blipFill>
+        <p:spPr bwMode="auto">
+          <a:xfrm>
+            <a:off x="733475" y="1600200"/>
+            <a:ext cx="7677050" cy="4525963"/>
+          </a:xfrm>
+          <a:prstGeom prst="rect">
+            <a:avLst/>
+          </a:prstGeom>
+          <a:noFill/>
+          <a:ln w="9525">
+            <a:noFill/>
+            <a:miter lim="800000"/>
+            <a:headEnd/>
+            <a:tailEnd/>
+          </a:ln>
+          <a:effectLst/>
+        </p:spPr>
+      </p:pic>
+      <p:sp>
+        <p:nvSpPr>
+          <p:cNvPr id="5" name="Rectangle 4"/>
+          <p:cNvSpPr/>
+          <p:nvPr/>
+        </p:nvSpPr>
+        <p:spPr>
+          <a:xfrm>
+            <a:off x="3203848" y="2204864"/>
+            <a:ext cx="1296144" cy="3024336"/>
+          </a:xfrm>
+          <a:prstGeom prst="rect">
+            <a:avLst/>
+          </a:prstGeom>
+          <a:noFill/>
+          <a:ln>
+            <a:solidFill>
+              <a:srgbClr val="FF0000"/>
+            </a:solidFill>
+          </a:ln>
+        </p:spPr>
+        <p:style>
+          <a:lnRef idx="2">
+            <a:schemeClr val="accent1">
+              <a:shade val="50000"/>
+            </a:schemeClr>
+          </a:lnRef>
+          <a:fillRef idx="1">
+            <a:schemeClr val="accent1"/>
+          </a:fillRef>
+          <a:effectRef idx="0">
+            <a:schemeClr val="accent1"/>
+          </a:effectRef>
+          <a:fontRef idx="minor">
+            <a:schemeClr val="lt1"/>
+          </a:fontRef>
+        </p:style>
+        <p:txBody>
+          <a:bodyPr rtlCol="0" anchor="ctr"/>
+          <a:lstStyle/>
+          <a:p>
+            <a:pPr algn="ctr"/>
+            <a:endParaRPr lang="en-GB">
+              <a:ln>
+                <a:solidFill>
+                  <a:srgbClr val="FF0000"/>
+                </a:solidFill>
+              </a:ln>
+            </a:endParaRPr>
+          </a:p>
+        </p:txBody>
+      </p:sp>
+      <p:sp>
+        <p:nvSpPr>
+          <p:cNvPr id="6" name="TextBox 5"/>
+          <p:cNvSpPr txBox="1"/>
+          <p:nvPr/>
+        </p:nvSpPr>
+        <p:spPr>
+          <a:xfrm>
+            <a:off x="4572000" y="2780928"/>
+            <a:ext cx="2520280" cy="646331"/>
+          </a:xfrm>
+          <a:prstGeom prst="rect">
+            <a:avLst/>
+          </a:prstGeom>
+          <a:noFill/>
+        </p:spPr>
+        <p:txBody>
+          <a:bodyPr wrap="square" rtlCol="0">
+            <a:spAutoFit/>
+          </a:bodyPr>
+          <a:lstStyle/>
+          <a:p>
+            <a:pPr algn="ctr"/>
+            <a:r>
+              <a:rPr lang="en-GB" dirty="0" smtClean="0"/>
+              <a:t>Dominant Process per Frame</a:t>
+            </a:r>
+            <a:endParaRPr lang="en-GB" dirty="0"/>
+          </a:p>
+        </p:txBody>
+      </p:sp>
+    </p:spTree>
+  </p:cSld>
+  <p:clrMapOvr>
+    <a:masterClrMapping/>
+  </p:clrMapOvr>
+  <p:timing>
+    <p:tnLst>
+      <p:par>
+        <p:cTn id="1" dur="indefinite" restart="never" nodeType="tmRoot"/>
+      </p:par>
+    </p:tnLst>
+  </p:timing>
+</p:sld>
+</file>
+
+<file path=ppt/slides/slide14.xml><?xml version="1.0" encoding="utf-8"?>
+<p:sld xmlns:a="http://schemas.openxmlformats.org/drawingml/2006/main" xmlns:r="http://schemas.openxmlformats.org/officeDocument/2006/relationships" xmlns:p="http://schemas.openxmlformats.org/presentationml/2006/main">
+  <p:cSld>
+    <p:spTree>
+      <p:nvGrpSpPr>
+        <p:cNvPr id="1" name=""/>
+        <p:cNvGrpSpPr/>
+        <p:nvPr/>
+      </p:nvGrpSpPr>
+      <p:grpSpPr>
+        <a:xfrm>
+          <a:off x="0" y="0"/>
+          <a:ext cx="0" cy="0"/>
+          <a:chOff x="0" y="0"/>
+          <a:chExt cx="0" cy="0"/>
+        </a:xfrm>
+      </p:grpSpPr>
+      <p:sp>
+        <p:nvSpPr>
+          <p:cNvPr id="2" name="Title 1"/>
+          <p:cNvSpPr>
+            <a:spLocks noGrp="1"/>
+          </p:cNvSpPr>
+          <p:nvPr>
+            <p:ph type="title"/>
+          </p:nvPr>
+        </p:nvSpPr>
+        <p:spPr/>
+        <p:txBody>
+          <a:bodyPr>
+            <a:normAutofit fontScale="90000"/>
+          </a:bodyPr>
+          <a:lstStyle/>
+          <a:p>
+            <a:r>
+              <a:rPr lang="en-GB" dirty="0" smtClean="0"/>
+              <a:t>Expected </a:t>
+            </a:r>
+            <a:r>
+              <a:rPr lang="en-GB" dirty="0" smtClean="0"/>
+              <a:t>Performance With Changing Unit Numbers 2</a:t>
+            </a:r>
+            <a:endParaRPr lang="en-GB" dirty="0"/>
+          </a:p>
+        </p:txBody>
+      </p:sp>
+      <p:sp>
+        <p:nvSpPr>
+          <p:cNvPr id="4" name="Rectangle 3"/>
+          <p:cNvSpPr/>
+          <p:nvPr/>
+        </p:nvSpPr>
+        <p:spPr>
+          <a:xfrm>
+            <a:off x="7884368" y="2996952"/>
+            <a:ext cx="720080" cy="3240360"/>
+          </a:xfrm>
+          <a:prstGeom prst="rect">
+            <a:avLst/>
+          </a:prstGeom>
+        </p:spPr>
+        <p:style>
+          <a:lnRef idx="2">
+            <a:schemeClr val="accent5">
+              <a:shade val="50000"/>
+            </a:schemeClr>
+          </a:lnRef>
+          <a:fillRef idx="1">
+            <a:schemeClr val="accent5"/>
+          </a:fillRef>
+          <a:effectRef idx="0">
+            <a:schemeClr val="accent5"/>
+          </a:effectRef>
+          <a:fontRef idx="minor">
+            <a:schemeClr val="lt1"/>
+          </a:fontRef>
+        </p:style>
+        <p:txBody>
+          <a:bodyPr vert="horz" rtlCol="0" anchor="ctr"/>
+          <a:lstStyle/>
+          <a:p>
+            <a:pPr algn="ctr"/>
+            <a:r>
+              <a:rPr lang="en-GB" dirty="0" smtClean="0"/>
+              <a:t>O(N</a:t>
+            </a:r>
+            <a:r>
+              <a:rPr lang="en-GB" baseline="-25000" dirty="0" smtClean="0"/>
+              <a:t>R</a:t>
+            </a:r>
+            <a:r>
+              <a:rPr lang="en-GB" dirty="0" smtClean="0"/>
+              <a:t>)</a:t>
+            </a:r>
+          </a:p>
+          <a:p>
+            <a:pPr algn="ctr"/>
+            <a:endParaRPr lang="en-GB" dirty="0" smtClean="0"/>
+          </a:p>
+          <a:p>
+            <a:pPr algn="ctr"/>
+            <a:endParaRPr lang="en-GB" dirty="0"/>
+          </a:p>
+        </p:txBody>
+      </p:sp>
+      <p:sp>
+        <p:nvSpPr>
+          <p:cNvPr id="5" name="Rectangle 4"/>
+          <p:cNvSpPr/>
+          <p:nvPr/>
+        </p:nvSpPr>
+        <p:spPr>
+          <a:xfrm>
+            <a:off x="4499992" y="1916832"/>
+            <a:ext cx="2160240" cy="432048"/>
+          </a:xfrm>
+          <a:prstGeom prst="rect">
+            <a:avLst/>
+          </a:prstGeom>
+        </p:spPr>
+        <p:style>
+          <a:lnRef idx="2">
+            <a:schemeClr val="accent2">
+              <a:shade val="50000"/>
+            </a:schemeClr>
+          </a:lnRef>
+          <a:fillRef idx="1">
+            <a:schemeClr val="accent2"/>
+          </a:fillRef>
+          <a:effectRef idx="0">
+            <a:schemeClr val="accent2"/>
+          </a:effectRef>
+          <a:fontRef idx="minor">
+            <a:schemeClr val="lt1"/>
+          </a:fontRef>
+        </p:style>
+        <p:txBody>
+          <a:bodyPr rtlCol="0" anchor="ctr"/>
+          <a:lstStyle/>
+          <a:p>
+            <a:pPr algn="ctr"/>
+            <a:r>
+              <a:rPr lang="en-GB" dirty="0" smtClean="0"/>
+              <a:t>Main Thread</a:t>
+            </a:r>
+            <a:endParaRPr lang="en-GB" dirty="0"/>
+          </a:p>
+        </p:txBody>
+      </p:sp>
+      <p:sp>
+        <p:nvSpPr>
+          <p:cNvPr id="6" name="Rectangle 5"/>
+          <p:cNvSpPr/>
+          <p:nvPr/>
+        </p:nvSpPr>
+        <p:spPr>
+          <a:xfrm>
+            <a:off x="4499992" y="2420888"/>
+            <a:ext cx="2160240" cy="432048"/>
+          </a:xfrm>
+          <a:prstGeom prst="rect">
+            <a:avLst/>
+          </a:prstGeom>
+        </p:spPr>
+        <p:style>
+          <a:lnRef idx="2">
+            <a:schemeClr val="accent4">
+              <a:shade val="50000"/>
+            </a:schemeClr>
+          </a:lnRef>
+          <a:fillRef idx="1">
+            <a:schemeClr val="accent4"/>
+          </a:fillRef>
+          <a:effectRef idx="0">
+            <a:schemeClr val="accent4"/>
+          </a:effectRef>
+          <a:fontRef idx="minor">
+            <a:schemeClr val="lt1"/>
+          </a:fontRef>
+        </p:style>
+        <p:txBody>
+          <a:bodyPr rtlCol="0" anchor="ctr"/>
+          <a:lstStyle/>
+          <a:p>
+            <a:pPr algn="ctr"/>
+            <a:r>
+              <a:rPr lang="en-GB" dirty="0" smtClean="0"/>
+              <a:t>Render Thread</a:t>
+            </a:r>
+            <a:endParaRPr lang="en-GB" dirty="0"/>
+          </a:p>
+        </p:txBody>
+      </p:sp>
+      <p:sp>
+        <p:nvSpPr>
+          <p:cNvPr id="7" name="Rectangle 6"/>
+          <p:cNvSpPr/>
+          <p:nvPr/>
+        </p:nvSpPr>
+        <p:spPr>
+          <a:xfrm>
+            <a:off x="6732240" y="2420888"/>
+            <a:ext cx="2160240" cy="432048"/>
+          </a:xfrm>
+          <a:prstGeom prst="rect">
+            <a:avLst/>
+          </a:prstGeom>
+        </p:spPr>
+        <p:style>
+          <a:lnRef idx="2">
+            <a:schemeClr val="accent6">
+              <a:shade val="50000"/>
+            </a:schemeClr>
+          </a:lnRef>
+          <a:fillRef idx="1">
+            <a:schemeClr val="accent6"/>
+          </a:fillRef>
+          <a:effectRef idx="0">
+            <a:schemeClr val="accent6"/>
+          </a:effectRef>
+          <a:fontRef idx="minor">
+            <a:schemeClr val="lt1"/>
+          </a:fontRef>
+        </p:style>
+        <p:txBody>
+          <a:bodyPr rtlCol="0" anchor="ctr"/>
+          <a:lstStyle/>
+          <a:p>
+            <a:pPr algn="ctr"/>
+            <a:r>
+              <a:rPr lang="en-GB" dirty="0" err="1" smtClean="0"/>
+              <a:t>GameObject</a:t>
+            </a:r>
+            <a:r>
+              <a:rPr lang="en-GB" dirty="0" smtClean="0"/>
+              <a:t> Threads</a:t>
+            </a:r>
+            <a:endParaRPr lang="en-GB" dirty="0"/>
+          </a:p>
+        </p:txBody>
+      </p:sp>
+      <p:sp>
+        <p:nvSpPr>
+          <p:cNvPr id="8" name="Rectangle 7"/>
+          <p:cNvSpPr/>
+          <p:nvPr/>
+        </p:nvSpPr>
+        <p:spPr>
+          <a:xfrm>
+            <a:off x="5220072" y="3573016"/>
+            <a:ext cx="2520280" cy="432048"/>
+          </a:xfrm>
+          <a:prstGeom prst="rect">
+            <a:avLst/>
+          </a:prstGeom>
+        </p:spPr>
+        <p:style>
+          <a:lnRef idx="2">
+            <a:schemeClr val="dk1">
+              <a:shade val="50000"/>
+            </a:schemeClr>
+          </a:lnRef>
+          <a:fillRef idx="1">
+            <a:schemeClr val="dk1"/>
+          </a:fillRef>
+          <a:effectRef idx="0">
+            <a:schemeClr val="dk1"/>
+          </a:effectRef>
+          <a:fontRef idx="minor">
+            <a:schemeClr val="lt1"/>
+          </a:fontRef>
+        </p:style>
+        <p:txBody>
+          <a:bodyPr rtlCol="0" anchor="ctr"/>
+          <a:lstStyle/>
+          <a:p>
+            <a:pPr algn="ctr"/>
+            <a:r>
+              <a:rPr lang="en-GB" dirty="0" smtClean="0"/>
+              <a:t>Process Barrier</a:t>
+            </a:r>
+            <a:endParaRPr lang="en-GB" dirty="0"/>
+          </a:p>
+        </p:txBody>
+      </p:sp>
+      <p:sp>
+        <p:nvSpPr>
+          <p:cNvPr id="9" name="Rectangle 8"/>
+          <p:cNvSpPr/>
+          <p:nvPr/>
+        </p:nvSpPr>
+        <p:spPr>
+          <a:xfrm>
+            <a:off x="5220072" y="4653136"/>
+            <a:ext cx="2520280" cy="432048"/>
+          </a:xfrm>
+          <a:prstGeom prst="rect">
+            <a:avLst/>
+          </a:prstGeom>
+        </p:spPr>
+        <p:style>
+          <a:lnRef idx="2">
+            <a:schemeClr val="dk1">
+              <a:shade val="50000"/>
+            </a:schemeClr>
+          </a:lnRef>
+          <a:fillRef idx="1">
+            <a:schemeClr val="dk1"/>
+          </a:fillRef>
+          <a:effectRef idx="0">
+            <a:schemeClr val="dk1"/>
+          </a:effectRef>
+          <a:fontRef idx="minor">
+            <a:schemeClr val="lt1"/>
+          </a:fontRef>
+        </p:style>
+        <p:txBody>
+          <a:bodyPr rtlCol="0" anchor="ctr"/>
+          <a:lstStyle/>
+          <a:p>
+            <a:pPr algn="ctr"/>
+            <a:r>
+              <a:rPr lang="en-GB" dirty="0" smtClean="0"/>
+              <a:t>Render Barrier</a:t>
+            </a:r>
+            <a:endParaRPr lang="en-GB" dirty="0"/>
+          </a:p>
+        </p:txBody>
+      </p:sp>
+      <p:sp>
+        <p:nvSpPr>
+          <p:cNvPr id="10" name="Rectangle 9"/>
+          <p:cNvSpPr/>
+          <p:nvPr/>
+        </p:nvSpPr>
+        <p:spPr>
+          <a:xfrm>
+            <a:off x="5220072" y="5805264"/>
+            <a:ext cx="2520280" cy="432048"/>
+          </a:xfrm>
+          <a:prstGeom prst="rect">
+            <a:avLst/>
+          </a:prstGeom>
+        </p:spPr>
+        <p:style>
+          <a:lnRef idx="2">
+            <a:schemeClr val="dk1">
+              <a:shade val="50000"/>
+            </a:schemeClr>
+          </a:lnRef>
+          <a:fillRef idx="1">
+            <a:schemeClr val="dk1"/>
+          </a:fillRef>
+          <a:effectRef idx="0">
+            <a:schemeClr val="dk1"/>
+          </a:effectRef>
+          <a:fontRef idx="minor">
+            <a:schemeClr val="lt1"/>
+          </a:fontRef>
+        </p:style>
+        <p:txBody>
+          <a:bodyPr rtlCol="0" anchor="ctr"/>
+          <a:lstStyle/>
+          <a:p>
+            <a:pPr algn="ctr"/>
+            <a:r>
+              <a:rPr lang="en-GB" dirty="0" smtClean="0"/>
+              <a:t>End Frame Barrier</a:t>
+            </a:r>
+            <a:endParaRPr lang="en-GB" dirty="0"/>
+          </a:p>
+        </p:txBody>
+      </p:sp>
+      <p:sp>
+        <p:nvSpPr>
+          <p:cNvPr id="11" name="Rectangle 10"/>
+          <p:cNvSpPr/>
+          <p:nvPr/>
+        </p:nvSpPr>
+        <p:spPr>
+          <a:xfrm>
+            <a:off x="6732240" y="1916832"/>
+            <a:ext cx="2160240" cy="432048"/>
+          </a:xfrm>
+          <a:prstGeom prst="rect">
+            <a:avLst/>
+          </a:prstGeom>
+        </p:spPr>
+        <p:style>
+          <a:lnRef idx="2">
+            <a:schemeClr val="accent5">
+              <a:shade val="50000"/>
+            </a:schemeClr>
+          </a:lnRef>
+          <a:fillRef idx="1">
+            <a:schemeClr val="accent5"/>
+          </a:fillRef>
+          <a:effectRef idx="0">
+            <a:schemeClr val="accent5"/>
+          </a:effectRef>
+          <a:fontRef idx="minor">
+            <a:schemeClr val="lt1"/>
+          </a:fontRef>
+        </p:style>
+        <p:txBody>
+          <a:bodyPr rtlCol="0" anchor="ctr"/>
+          <a:lstStyle/>
+          <a:p>
+            <a:pPr algn="ctr"/>
+            <a:r>
+              <a:rPr lang="en-GB" dirty="0" smtClean="0"/>
+              <a:t>Path Finding Threads</a:t>
+            </a:r>
+            <a:endParaRPr lang="en-GB" dirty="0"/>
+          </a:p>
+        </p:txBody>
+      </p:sp>
+      <p:sp>
+        <p:nvSpPr>
+          <p:cNvPr id="12" name="Rectangle 11"/>
+          <p:cNvSpPr/>
+          <p:nvPr/>
+        </p:nvSpPr>
+        <p:spPr>
+          <a:xfrm>
+            <a:off x="5220072" y="2996952"/>
+            <a:ext cx="1224136" cy="432048"/>
+          </a:xfrm>
+          <a:prstGeom prst="rect">
+            <a:avLst/>
+          </a:prstGeom>
+        </p:spPr>
+        <p:style>
+          <a:lnRef idx="2">
+            <a:schemeClr val="accent2">
+              <a:shade val="50000"/>
+            </a:schemeClr>
+          </a:lnRef>
+          <a:fillRef idx="1">
+            <a:schemeClr val="accent2"/>
+          </a:fillRef>
+          <a:effectRef idx="0">
+            <a:schemeClr val="accent2"/>
+          </a:effectRef>
+          <a:fontRef idx="minor">
+            <a:schemeClr val="lt1"/>
+          </a:fontRef>
+        </p:style>
+        <p:txBody>
+          <a:bodyPr rtlCol="0" anchor="ctr"/>
+          <a:lstStyle/>
+          <a:p>
+            <a:pPr algn="ctr"/>
+            <a:r>
+              <a:rPr lang="en-GB" dirty="0" smtClean="0"/>
+              <a:t>O(</a:t>
+            </a:r>
+            <a:r>
+              <a:rPr lang="en-GB" dirty="0" err="1" smtClean="0"/>
+              <a:t>N</a:t>
+            </a:r>
+            <a:r>
+              <a:rPr lang="en-GB" baseline="-25000" dirty="0" err="1" smtClean="0"/>
+              <a:t>u</a:t>
+            </a:r>
+            <a:r>
+              <a:rPr lang="en-GB" dirty="0" err="1" smtClean="0"/>
+              <a:t>+N</a:t>
+            </a:r>
+            <a:r>
+              <a:rPr lang="en-GB" baseline="-25000" dirty="0" err="1" smtClean="0"/>
+              <a:t>p</a:t>
+            </a:r>
+            <a:r>
+              <a:rPr lang="en-GB" dirty="0" smtClean="0"/>
+              <a:t>)</a:t>
+            </a:r>
+            <a:endParaRPr lang="en-GB" dirty="0"/>
+          </a:p>
+        </p:txBody>
+      </p:sp>
+      <p:sp>
+        <p:nvSpPr>
+          <p:cNvPr id="13" name="Rectangle 12"/>
+          <p:cNvSpPr/>
+          <p:nvPr/>
+        </p:nvSpPr>
+        <p:spPr>
+          <a:xfrm>
+            <a:off x="6588224" y="2996952"/>
+            <a:ext cx="1152128" cy="432048"/>
+          </a:xfrm>
+          <a:prstGeom prst="rect">
+            <a:avLst/>
+          </a:prstGeom>
+        </p:spPr>
+        <p:style>
+          <a:lnRef idx="2">
+            <a:schemeClr val="accent4">
+              <a:shade val="50000"/>
+            </a:schemeClr>
+          </a:lnRef>
+          <a:fillRef idx="1">
+            <a:schemeClr val="accent4"/>
+          </a:fillRef>
+          <a:effectRef idx="0">
+            <a:schemeClr val="accent4"/>
+          </a:effectRef>
+          <a:fontRef idx="minor">
+            <a:schemeClr val="lt1"/>
+          </a:fontRef>
+        </p:style>
+        <p:txBody>
+          <a:bodyPr rtlCol="0" anchor="ctr"/>
+          <a:lstStyle/>
+          <a:p>
+            <a:pPr algn="ctr"/>
+            <a:r>
+              <a:rPr lang="en-GB" dirty="0" smtClean="0"/>
+              <a:t>O(N</a:t>
+            </a:r>
+            <a:r>
+              <a:rPr lang="en-GB" baseline="-25000" dirty="0" smtClean="0"/>
+              <a:t>T</a:t>
+            </a:r>
+            <a:r>
+              <a:rPr lang="en-GB" dirty="0" smtClean="0"/>
+              <a:t>*N</a:t>
+            </a:r>
+            <a:r>
+              <a:rPr lang="en-GB" baseline="-25000" dirty="0" smtClean="0"/>
+              <a:t>T</a:t>
+            </a:r>
+            <a:r>
+              <a:rPr lang="en-GB" dirty="0" smtClean="0"/>
+              <a:t>)</a:t>
+            </a:r>
+            <a:endParaRPr lang="en-GB" dirty="0"/>
+          </a:p>
+        </p:txBody>
+      </p:sp>
+      <p:sp>
+        <p:nvSpPr>
+          <p:cNvPr id="14" name="Rectangle 13"/>
+          <p:cNvSpPr/>
+          <p:nvPr/>
+        </p:nvSpPr>
+        <p:spPr>
+          <a:xfrm>
+            <a:off x="5220072" y="4077072"/>
+            <a:ext cx="2520280" cy="432048"/>
+          </a:xfrm>
+          <a:prstGeom prst="rect">
+            <a:avLst/>
+          </a:prstGeom>
+        </p:spPr>
+        <p:style>
+          <a:lnRef idx="2">
+            <a:schemeClr val="accent6">
+              <a:shade val="50000"/>
+            </a:schemeClr>
+          </a:lnRef>
+          <a:fillRef idx="1">
+            <a:schemeClr val="accent6"/>
+          </a:fillRef>
+          <a:effectRef idx="0">
+            <a:schemeClr val="accent6"/>
+          </a:effectRef>
+          <a:fontRef idx="minor">
+            <a:schemeClr val="lt1"/>
+          </a:fontRef>
+        </p:style>
+        <p:txBody>
+          <a:bodyPr rtlCol="0" anchor="ctr"/>
+          <a:lstStyle/>
+          <a:p>
+            <a:pPr algn="ctr"/>
+            <a:r>
+              <a:rPr lang="en-GB" dirty="0" smtClean="0"/>
+              <a:t>O(N</a:t>
+            </a:r>
+            <a:r>
+              <a:rPr lang="en-GB" baseline="-25000" dirty="0" smtClean="0"/>
+              <a:t>u </a:t>
+            </a:r>
+            <a:r>
+              <a:rPr lang="en-GB" dirty="0" smtClean="0"/>
+              <a:t>+</a:t>
+            </a:r>
+            <a:r>
+              <a:rPr lang="en-GB" dirty="0" err="1" smtClean="0"/>
+              <a:t>N</a:t>
+            </a:r>
+            <a:r>
+              <a:rPr lang="en-GB" baseline="-25000" dirty="0" err="1" smtClean="0"/>
+              <a:t>p</a:t>
+            </a:r>
+            <a:r>
+              <a:rPr lang="en-GB" dirty="0" smtClean="0"/>
+              <a:t>)</a:t>
+            </a:r>
+            <a:endParaRPr lang="en-GB" dirty="0"/>
+          </a:p>
+        </p:txBody>
+      </p:sp>
+      <p:sp>
+        <p:nvSpPr>
+          <p:cNvPr id="16" name="Rectangle 15"/>
+          <p:cNvSpPr/>
+          <p:nvPr/>
+        </p:nvSpPr>
+        <p:spPr>
+          <a:xfrm>
+            <a:off x="5220072" y="5229200"/>
+            <a:ext cx="2520280" cy="432048"/>
+          </a:xfrm>
+          <a:prstGeom prst="rect">
+            <a:avLst/>
+          </a:prstGeom>
+        </p:spPr>
+        <p:style>
+          <a:lnRef idx="2">
+            <a:schemeClr val="accent4">
+              <a:shade val="50000"/>
+            </a:schemeClr>
+          </a:lnRef>
+          <a:fillRef idx="1">
+            <a:schemeClr val="accent4"/>
+          </a:fillRef>
+          <a:effectRef idx="0">
+            <a:schemeClr val="accent4"/>
+          </a:effectRef>
+          <a:fontRef idx="minor">
+            <a:schemeClr val="lt1"/>
+          </a:fontRef>
+        </p:style>
+        <p:txBody>
+          <a:bodyPr rtlCol="0" anchor="ctr"/>
+          <a:lstStyle/>
+          <a:p>
+            <a:pPr algn="ctr"/>
+            <a:r>
+              <a:rPr lang="en-GB" dirty="0" smtClean="0"/>
+              <a:t>O(</a:t>
+            </a:r>
+            <a:r>
+              <a:rPr lang="en-GB" dirty="0" err="1" smtClean="0"/>
+              <a:t>N</a:t>
+            </a:r>
+            <a:r>
+              <a:rPr lang="en-GB" baseline="-25000" dirty="0" err="1" smtClean="0"/>
+              <a:t>u</a:t>
+            </a:r>
+            <a:r>
+              <a:rPr lang="en-GB" dirty="0" err="1" smtClean="0"/>
+              <a:t>+N</a:t>
+            </a:r>
+            <a:r>
+              <a:rPr lang="en-GB" baseline="-25000" dirty="0" err="1" smtClean="0"/>
+              <a:t>p</a:t>
+            </a:r>
+            <a:r>
+              <a:rPr lang="en-GB" dirty="0" err="1" smtClean="0"/>
+              <a:t>+N</a:t>
+            </a:r>
+            <a:r>
+              <a:rPr lang="en-GB" baseline="-25000" dirty="0" err="1" smtClean="0"/>
+              <a:t>T</a:t>
+            </a:r>
+            <a:r>
+              <a:rPr lang="en-GB" dirty="0" smtClean="0"/>
+              <a:t>*N</a:t>
+            </a:r>
+            <a:r>
+              <a:rPr lang="en-GB" baseline="-25000" dirty="0" smtClean="0"/>
+              <a:t>T</a:t>
+            </a:r>
+            <a:r>
+              <a:rPr lang="en-GB" dirty="0" smtClean="0"/>
+              <a:t>)</a:t>
+            </a:r>
+            <a:endParaRPr lang="en-GB" dirty="0"/>
+          </a:p>
+        </p:txBody>
+      </p:sp>
+      <p:sp>
+        <p:nvSpPr>
+          <p:cNvPr id="15" name="TextBox 14"/>
+          <p:cNvSpPr txBox="1"/>
+          <p:nvPr/>
+        </p:nvSpPr>
+        <p:spPr>
+          <a:xfrm>
+            <a:off x="323528" y="2060848"/>
+            <a:ext cx="3960440" cy="4524315"/>
+          </a:xfrm>
+          <a:prstGeom prst="rect">
+            <a:avLst/>
+          </a:prstGeom>
+          <a:noFill/>
+        </p:spPr>
+        <p:txBody>
+          <a:bodyPr wrap="square" rtlCol="0">
+            <a:spAutoFit/>
+          </a:bodyPr>
+          <a:lstStyle/>
+          <a:p>
+            <a:pPr>
+              <a:buFont typeface="Arial" pitchFamily="34" charset="0"/>
+              <a:buChar char="•"/>
+            </a:pPr>
+            <a:r>
+              <a:rPr lang="en-GB" dirty="0" smtClean="0"/>
+              <a:t> </a:t>
+            </a:r>
+            <a:r>
+              <a:rPr lang="en-GB" dirty="0" err="1" smtClean="0"/>
+              <a:t>PathFind</a:t>
+            </a:r>
+            <a:r>
+              <a:rPr lang="en-GB" dirty="0" smtClean="0"/>
+              <a:t> Threads have no impact on the FPS but will make units less responsive waiting on paths.</a:t>
+            </a:r>
+          </a:p>
+          <a:p>
+            <a:pPr>
+              <a:buFont typeface="Arial" pitchFamily="34" charset="0"/>
+              <a:buChar char="•"/>
+            </a:pPr>
+            <a:endParaRPr lang="en-GB" dirty="0" smtClean="0"/>
+          </a:p>
+          <a:p>
+            <a:pPr>
+              <a:buFont typeface="Arial" pitchFamily="34" charset="0"/>
+              <a:buChar char="•"/>
+            </a:pPr>
+            <a:r>
+              <a:rPr lang="en-GB" dirty="0" smtClean="0"/>
+              <a:t> </a:t>
+            </a:r>
+            <a:r>
+              <a:rPr lang="en-GB" dirty="0" smtClean="0"/>
+              <a:t>Units required listed through 3 times in containers (such as Vector or Queue) so units will impact performance by O(N)</a:t>
+            </a:r>
+          </a:p>
+          <a:p>
+            <a:endParaRPr lang="en-GB" dirty="0" smtClean="0"/>
+          </a:p>
+          <a:p>
+            <a:pPr>
+              <a:buFont typeface="Arial" pitchFamily="34" charset="0"/>
+              <a:buChar char="•"/>
+            </a:pPr>
+            <a:r>
+              <a:rPr lang="en-GB" dirty="0" smtClean="0"/>
+              <a:t> Increasing the map dimension to accommodate units will require O(N</a:t>
+            </a:r>
+            <a:r>
+              <a:rPr lang="en-GB" baseline="30000" dirty="0" smtClean="0"/>
+              <a:t>2</a:t>
+            </a:r>
+            <a:r>
+              <a:rPr lang="en-GB" dirty="0" smtClean="0"/>
+              <a:t>)</a:t>
+            </a:r>
+          </a:p>
+          <a:p>
+            <a:pPr>
+              <a:buFont typeface="Arial" pitchFamily="34" charset="0"/>
+              <a:buChar char="•"/>
+            </a:pPr>
+            <a:endParaRPr lang="en-GB" dirty="0" smtClean="0"/>
+          </a:p>
+          <a:p>
+            <a:pPr>
+              <a:buFont typeface="Arial" pitchFamily="34" charset="0"/>
+              <a:buChar char="•"/>
+            </a:pPr>
+            <a:r>
+              <a:rPr lang="en-GB" dirty="0" smtClean="0"/>
+              <a:t> Estimate the performance will decrease by </a:t>
+            </a:r>
+            <a:r>
+              <a:rPr lang="en-GB" dirty="0" smtClean="0"/>
+              <a:t>O(N</a:t>
+            </a:r>
+            <a:r>
+              <a:rPr lang="en-GB" baseline="30000" dirty="0" smtClean="0"/>
+              <a:t>2</a:t>
+            </a:r>
+            <a:r>
+              <a:rPr lang="en-GB" dirty="0" smtClean="0"/>
+              <a:t>) of the map not the units which is the dominant factor as Rendering consumes the most frame time.</a:t>
+            </a:r>
+            <a:endParaRPr lang="en-GB" dirty="0"/>
+          </a:p>
+        </p:txBody>
+      </p:sp>
+    </p:spTree>
+  </p:cSld>
+  <p:clrMapOvr>
+    <a:masterClrMapping/>
+  </p:clrMapOvr>
+  <p:timing>
+    <p:tnLst>
+      <p:par>
+        <p:cTn id="1" dur="indefinite" restart="never" nodeType="tmRoot"/>
+      </p:par>
+    </p:tnLst>
+  </p:timing>
+</p:sld>
+</file>
+
+<file path=ppt/slides/slide15.xml><?xml version="1.0" encoding="utf-8"?>
+<p:sld xmlns:a="http://schemas.openxmlformats.org/drawingml/2006/main" xmlns:r="http://schemas.openxmlformats.org/officeDocument/2006/relationships" xmlns:p="http://schemas.openxmlformats.org/presentationml/2006/main">
+  <p:cSld>
+    <p:spTree>
+      <p:nvGrpSpPr>
+        <p:cNvPr id="1" name=""/>
+        <p:cNvGrpSpPr/>
+        <p:nvPr/>
+      </p:nvGrpSpPr>
+      <p:grpSpPr>
+        <a:xfrm>
+          <a:off x="0" y="0"/>
+          <a:ext cx="0" cy="0"/>
+          <a:chOff x="0" y="0"/>
+          <a:chExt cx="0" cy="0"/>
+        </a:xfrm>
+      </p:grpSpPr>
+      <p:pic>
+        <p:nvPicPr>
+          <p:cNvPr id="5122" name="Picture 2"/>
+          <p:cNvPicPr>
+            <a:picLocks noChangeAspect="1" noChangeArrowheads="1"/>
+          </p:cNvPicPr>
+          <p:nvPr/>
+        </p:nvPicPr>
+        <p:blipFill>
+          <a:blip r:embed="rId2" cstate="print"/>
+          <a:srcRect/>
+          <a:stretch>
+            <a:fillRect/>
+          </a:stretch>
+        </p:blipFill>
+        <p:spPr bwMode="auto">
+          <a:xfrm>
+            <a:off x="467544" y="1628800"/>
+            <a:ext cx="8118596" cy="4320480"/>
+          </a:xfrm>
+          <a:prstGeom prst="rect">
+            <a:avLst/>
+          </a:prstGeom>
+          <a:noFill/>
+          <a:ln w="9525">
+            <a:noFill/>
+            <a:miter lim="800000"/>
+            <a:headEnd/>
+            <a:tailEnd/>
+          </a:ln>
+          <a:effectLst/>
+        </p:spPr>
+      </p:pic>
+      <p:sp>
+        <p:nvSpPr>
+          <p:cNvPr id="2" name="Title 1"/>
+          <p:cNvSpPr>
+            <a:spLocks noGrp="1"/>
+          </p:cNvSpPr>
+          <p:nvPr>
+            <p:ph type="title"/>
+          </p:nvPr>
+        </p:nvSpPr>
+        <p:spPr/>
+        <p:txBody>
+          <a:bodyPr/>
+          <a:lstStyle/>
+          <a:p>
+            <a:r>
+              <a:rPr lang="en-GB" dirty="0" smtClean="0"/>
+              <a:t>How well does this scale 2</a:t>
+            </a:r>
+            <a:endParaRPr lang="en-GB" dirty="0"/>
           </a:p>
         </p:txBody>
       </p:sp>
       <p:cxnSp>
         <p:nvCxnSpPr>
-          <p:cNvPr id="7" name="Straight Arrow Connector 6"/>
+          <p:cNvPr id="10" name="Straight Arrow Connector 9"/>
           <p:cNvCxnSpPr/>
           <p:nvPr/>
         </p:nvCxnSpPr>
         <p:spPr>
           <a:xfrm flipV="1">
-            <a:off x="6084168" y="1844824"/>
-            <a:ext cx="792088" cy="864096"/>
+            <a:off x="4572000" y="3789040"/>
+            <a:ext cx="1224136" cy="468922"/>
+          </a:xfrm>
+          <a:prstGeom prst="straightConnector1">
+            <a:avLst/>
+          </a:prstGeom>
+          <a:ln>
+            <a:tailEnd type="arrow"/>
+          </a:ln>
+        </p:spPr>
+        <p:style>
+          <a:lnRef idx="2">
+            <a:schemeClr val="accent1"/>
+          </a:lnRef>
+          <a:fillRef idx="0">
+            <a:schemeClr val="accent1"/>
+          </a:fillRef>
+          <a:effectRef idx="1">
+            <a:schemeClr val="accent1"/>
+          </a:effectRef>
+          <a:fontRef idx="minor">
+            <a:schemeClr val="tx1"/>
+          </a:fontRef>
+        </p:style>
+      </p:cxnSp>
+      <p:sp>
+        <p:nvSpPr>
+          <p:cNvPr id="11" name="TextBox 10"/>
+          <p:cNvSpPr txBox="1"/>
+          <p:nvPr/>
+        </p:nvSpPr>
+        <p:spPr>
+          <a:xfrm>
+            <a:off x="5868144" y="3429000"/>
+            <a:ext cx="1584176" cy="646331"/>
+          </a:xfrm>
+          <a:prstGeom prst="rect">
+            <a:avLst/>
+          </a:prstGeom>
+          <a:noFill/>
+        </p:spPr>
+        <p:txBody>
+          <a:bodyPr wrap="square" rtlCol="0">
+            <a:spAutoFit/>
+          </a:bodyPr>
+          <a:lstStyle/>
+          <a:p>
+            <a:r>
+              <a:rPr lang="en-GB" dirty="0" smtClean="0"/>
+              <a:t>FPS decreases at </a:t>
+            </a:r>
+            <a:r>
+              <a:rPr lang="en-GB" dirty="0" smtClean="0"/>
+              <a:t>≈O(N</a:t>
+            </a:r>
+            <a:r>
+              <a:rPr lang="en-GB" baseline="30000" dirty="0" smtClean="0"/>
+              <a:t>2</a:t>
+            </a:r>
+            <a:r>
+              <a:rPr lang="en-GB" dirty="0" smtClean="0"/>
+              <a:t>)</a:t>
+            </a:r>
+            <a:endParaRPr lang="en-GB" dirty="0"/>
+          </a:p>
+        </p:txBody>
+      </p:sp>
+      <p:pic>
+        <p:nvPicPr>
+          <p:cNvPr id="5123" name="Picture 3"/>
+          <p:cNvPicPr>
+            <a:picLocks noChangeAspect="1" noChangeArrowheads="1"/>
+          </p:cNvPicPr>
+          <p:nvPr/>
+        </p:nvPicPr>
+        <p:blipFill>
+          <a:blip r:embed="rId3" cstate="print"/>
+          <a:srcRect/>
+          <a:stretch>
+            <a:fillRect/>
+          </a:stretch>
+        </p:blipFill>
+        <p:spPr bwMode="auto">
+          <a:xfrm>
+            <a:off x="539552" y="5949280"/>
+            <a:ext cx="8424863" cy="311150"/>
+          </a:xfrm>
+          <a:prstGeom prst="rect">
+            <a:avLst/>
+          </a:prstGeom>
+          <a:noFill/>
+          <a:ln w="9525">
+            <a:noFill/>
+            <a:miter lim="800000"/>
+            <a:headEnd/>
+            <a:tailEnd/>
+          </a:ln>
+          <a:effectLst/>
+        </p:spPr>
+      </p:pic>
+    </p:spTree>
+  </p:cSld>
+  <p:clrMapOvr>
+    <a:masterClrMapping/>
+  </p:clrMapOvr>
+  <p:timing>
+    <p:tnLst>
+      <p:par>
+        <p:cTn id="1" dur="indefinite" restart="never" nodeType="tmRoot"/>
+      </p:par>
+    </p:tnLst>
+  </p:timing>
+</p:sld>
+</file>
+
+<file path=ppt/slides/slide16.xml><?xml version="1.0" encoding="utf-8"?>
+<p:sld xmlns:a="http://schemas.openxmlformats.org/drawingml/2006/main" xmlns:r="http://schemas.openxmlformats.org/officeDocument/2006/relationships" xmlns:p="http://schemas.openxmlformats.org/presentationml/2006/main">
+  <p:cSld>
+    <p:spTree>
+      <p:nvGrpSpPr>
+        <p:cNvPr id="1" name=""/>
+        <p:cNvGrpSpPr/>
+        <p:nvPr/>
+      </p:nvGrpSpPr>
+      <p:grpSpPr>
+        <a:xfrm>
+          <a:off x="0" y="0"/>
+          <a:ext cx="0" cy="0"/>
+          <a:chOff x="0" y="0"/>
+          <a:chExt cx="0" cy="0"/>
+        </a:xfrm>
+      </p:grpSpPr>
+      <p:sp>
+        <p:nvSpPr>
+          <p:cNvPr id="2" name="Title 1"/>
+          <p:cNvSpPr>
+            <a:spLocks noGrp="1"/>
+          </p:cNvSpPr>
+          <p:nvPr>
+            <p:ph type="title"/>
+          </p:nvPr>
+        </p:nvSpPr>
+        <p:spPr/>
+        <p:txBody>
+          <a:bodyPr/>
+          <a:lstStyle/>
+          <a:p>
+            <a:r>
+              <a:rPr lang="en-GB" dirty="0" smtClean="0"/>
+              <a:t>How well does this </a:t>
+            </a:r>
+            <a:r>
+              <a:rPr lang="en-GB" dirty="0" smtClean="0"/>
+              <a:t>scale 2</a:t>
+            </a:r>
+            <a:endParaRPr lang="en-GB" dirty="0"/>
+          </a:p>
+        </p:txBody>
+      </p:sp>
+      <p:pic>
+        <p:nvPicPr>
+          <p:cNvPr id="4098" name="Picture 2"/>
+          <p:cNvPicPr>
+            <a:picLocks noGrp="1" noChangeAspect="1" noChangeArrowheads="1"/>
+          </p:cNvPicPr>
+          <p:nvPr>
+            <p:ph idx="1"/>
+          </p:nvPr>
+        </p:nvPicPr>
+        <p:blipFill>
+          <a:blip r:embed="rId2" cstate="print"/>
+          <a:srcRect/>
+          <a:stretch>
+            <a:fillRect/>
+          </a:stretch>
+        </p:blipFill>
+        <p:spPr bwMode="auto">
+          <a:xfrm>
+            <a:off x="740332" y="1604417"/>
+            <a:ext cx="7663336" cy="4517528"/>
+          </a:xfrm>
+          <a:prstGeom prst="rect">
+            <a:avLst/>
+          </a:prstGeom>
+          <a:noFill/>
+          <a:ln w="9525">
+            <a:noFill/>
+            <a:miter lim="800000"/>
+            <a:headEnd/>
+            <a:tailEnd/>
+          </a:ln>
+          <a:effectLst/>
+        </p:spPr>
+      </p:pic>
+      <p:pic>
+        <p:nvPicPr>
+          <p:cNvPr id="4099" name="Picture 3"/>
+          <p:cNvPicPr>
+            <a:picLocks noChangeAspect="1" noChangeArrowheads="1"/>
+          </p:cNvPicPr>
+          <p:nvPr/>
+        </p:nvPicPr>
+        <p:blipFill>
+          <a:blip r:embed="rId3" cstate="print"/>
+          <a:srcRect/>
+          <a:stretch>
+            <a:fillRect/>
+          </a:stretch>
+        </p:blipFill>
+        <p:spPr bwMode="auto">
+          <a:xfrm>
+            <a:off x="467544" y="6165304"/>
+            <a:ext cx="8424863" cy="317500"/>
+          </a:xfrm>
+          <a:prstGeom prst="rect">
+            <a:avLst/>
+          </a:prstGeom>
+          <a:noFill/>
+          <a:ln w="9525">
+            <a:noFill/>
+            <a:miter lim="800000"/>
+            <a:headEnd/>
+            <a:tailEnd/>
+          </a:ln>
+          <a:effectLst/>
+        </p:spPr>
+      </p:pic>
+      <p:sp>
+        <p:nvSpPr>
+          <p:cNvPr id="9" name="Rectangle 8"/>
+          <p:cNvSpPr/>
+          <p:nvPr/>
+        </p:nvSpPr>
+        <p:spPr>
+          <a:xfrm>
+            <a:off x="1619672" y="6165304"/>
+            <a:ext cx="504056" cy="360040"/>
+          </a:xfrm>
+          <a:prstGeom prst="rect">
+            <a:avLst/>
+          </a:prstGeom>
+          <a:noFill/>
+          <a:ln>
+            <a:solidFill>
+              <a:srgbClr val="FF0000"/>
+            </a:solidFill>
+          </a:ln>
+        </p:spPr>
+        <p:style>
+          <a:lnRef idx="2">
+            <a:schemeClr val="accent1">
+              <a:shade val="50000"/>
+            </a:schemeClr>
+          </a:lnRef>
+          <a:fillRef idx="1">
+            <a:schemeClr val="accent1"/>
+          </a:fillRef>
+          <a:effectRef idx="0">
+            <a:schemeClr val="accent1"/>
+          </a:effectRef>
+          <a:fontRef idx="minor">
+            <a:schemeClr val="lt1"/>
+          </a:fontRef>
+        </p:style>
+        <p:txBody>
+          <a:bodyPr rtlCol="0" anchor="ctr"/>
+          <a:lstStyle/>
+          <a:p>
+            <a:pPr algn="ctr"/>
+            <a:endParaRPr lang="en-GB"/>
+          </a:p>
+        </p:txBody>
+      </p:sp>
+      <p:sp>
+        <p:nvSpPr>
+          <p:cNvPr id="10" name="Rectangle 9"/>
+          <p:cNvSpPr/>
+          <p:nvPr/>
+        </p:nvSpPr>
+        <p:spPr>
+          <a:xfrm>
+            <a:off x="5580112" y="6165304"/>
+            <a:ext cx="504056" cy="360040"/>
+          </a:xfrm>
+          <a:prstGeom prst="rect">
+            <a:avLst/>
+          </a:prstGeom>
+          <a:noFill/>
+          <a:ln>
+            <a:solidFill>
+              <a:srgbClr val="FF0000"/>
+            </a:solidFill>
+          </a:ln>
+        </p:spPr>
+        <p:style>
+          <a:lnRef idx="2">
+            <a:schemeClr val="accent1">
+              <a:shade val="50000"/>
+            </a:schemeClr>
+          </a:lnRef>
+          <a:fillRef idx="1">
+            <a:schemeClr val="accent1"/>
+          </a:fillRef>
+          <a:effectRef idx="0">
+            <a:schemeClr val="accent1"/>
+          </a:effectRef>
+          <a:fontRef idx="minor">
+            <a:schemeClr val="lt1"/>
+          </a:fontRef>
+        </p:style>
+        <p:txBody>
+          <a:bodyPr rtlCol="0" anchor="ctr"/>
+          <a:lstStyle/>
+          <a:p>
+            <a:pPr algn="ctr"/>
+            <a:endParaRPr lang="en-GB"/>
+          </a:p>
+        </p:txBody>
+      </p:sp>
+      <p:cxnSp>
+        <p:nvCxnSpPr>
+          <p:cNvPr id="12" name="Straight Arrow Connector 11"/>
+          <p:cNvCxnSpPr/>
+          <p:nvPr/>
+        </p:nvCxnSpPr>
+        <p:spPr>
+          <a:xfrm flipV="1">
+            <a:off x="2123728" y="3356992"/>
+            <a:ext cx="1728192" cy="2808312"/>
           </a:xfrm>
           <a:prstGeom prst="straightConnector1">
             <a:avLst/>
@@ -4094,117 +5293,16 @@
           </a:fontRef>
         </p:style>
       </p:cxnSp>
-      <p:sp>
-        <p:nvSpPr>
-          <p:cNvPr id="8" name="TextBox 7"/>
-          <p:cNvSpPr txBox="1"/>
-          <p:nvPr/>
-        </p:nvSpPr>
-        <p:spPr>
-          <a:xfrm>
-            <a:off x="6876256" y="1340768"/>
-            <a:ext cx="1584176" cy="646331"/>
-          </a:xfrm>
-          <a:prstGeom prst="rect">
-            <a:avLst/>
-          </a:prstGeom>
-          <a:noFill/>
-        </p:spPr>
-        <p:txBody>
-          <a:bodyPr wrap="square" rtlCol="0">
-            <a:spAutoFit/>
-          </a:bodyPr>
-          <a:lstStyle/>
-          <a:p>
-            <a:r>
-              <a:rPr lang="en-GB" dirty="0" smtClean="0"/>
-              <a:t>Exceeded 60s test time</a:t>
-            </a:r>
-            <a:endParaRPr lang="en-GB" dirty="0"/>
-          </a:p>
-        </p:txBody>
-      </p:sp>
       <p:cxnSp>
         <p:nvCxnSpPr>
-          <p:cNvPr id="10" name="Straight Arrow Connector 9"/>
+          <p:cNvPr id="14" name="Straight Arrow Connector 13"/>
           <p:cNvCxnSpPr/>
           <p:nvPr/>
         </p:nvCxnSpPr>
         <p:spPr>
-          <a:xfrm flipH="1">
-            <a:off x="3347864" y="4221088"/>
-            <a:ext cx="1008112" cy="1872208"/>
-          </a:xfrm>
-          <a:prstGeom prst="straightConnector1">
-            <a:avLst/>
-          </a:prstGeom>
-          <a:ln>
-            <a:tailEnd type="arrow"/>
-          </a:ln>
-        </p:spPr>
-        <p:style>
-          <a:lnRef idx="2">
-            <a:schemeClr val="accent1"/>
-          </a:lnRef>
-          <a:fillRef idx="0">
-            <a:schemeClr val="accent1"/>
-          </a:fillRef>
-          <a:effectRef idx="1">
-            <a:schemeClr val="accent1"/>
-          </a:effectRef>
-          <a:fontRef idx="minor">
-            <a:schemeClr val="tx1"/>
-          </a:fontRef>
-        </p:style>
-      </p:cxnSp>
-      <p:sp>
-        <p:nvSpPr>
-          <p:cNvPr id="11" name="TextBox 10"/>
-          <p:cNvSpPr txBox="1"/>
-          <p:nvPr/>
-        </p:nvSpPr>
-        <p:spPr>
-          <a:xfrm>
-            <a:off x="1763688" y="5805264"/>
-            <a:ext cx="1584176" cy="646331"/>
-          </a:xfrm>
-          <a:prstGeom prst="rect">
-            <a:avLst/>
-          </a:prstGeom>
-          <a:noFill/>
-        </p:spPr>
-        <p:txBody>
-          <a:bodyPr wrap="square" rtlCol="0">
-            <a:spAutoFit/>
-          </a:bodyPr>
-          <a:lstStyle/>
-          <a:p>
-            <a:r>
-              <a:rPr lang="en-GB" dirty="0" smtClean="0"/>
-              <a:t>FPS decreases at O(N</a:t>
-            </a:r>
-            <a:r>
-              <a:rPr lang="en-GB" baseline="30000" dirty="0" smtClean="0"/>
-              <a:t>2</a:t>
-            </a:r>
-            <a:r>
-              <a:rPr lang="en-GB" dirty="0" smtClean="0"/>
-              <a:t>)</a:t>
-            </a:r>
-            <a:endParaRPr lang="en-GB" dirty="0"/>
-          </a:p>
-        </p:txBody>
-      </p:sp>
-      <p:cxnSp>
-        <p:nvCxnSpPr>
-          <p:cNvPr id="12" name="Straight Arrow Connector 11"/>
-          <p:cNvCxnSpPr/>
-          <p:nvPr/>
-        </p:nvCxnSpPr>
-        <p:spPr>
           <a:xfrm flipH="1" flipV="1">
-            <a:off x="971600" y="2420888"/>
-            <a:ext cx="2520280" cy="1584176"/>
+            <a:off x="4716016" y="3501008"/>
+            <a:ext cx="1080120" cy="2592288"/>
           </a:xfrm>
           <a:prstGeom prst="straightConnector1">
             <a:avLst/>
@@ -4230,35 +5328,59 @@
       </p:cxnSp>
       <p:sp>
         <p:nvSpPr>
-          <p:cNvPr id="15" name="TextBox 14"/>
-          <p:cNvSpPr txBox="1"/>
-          <p:nvPr/>
-        </p:nvSpPr>
-        <p:spPr>
-          <a:xfrm>
-            <a:off x="251520" y="1484784"/>
-            <a:ext cx="1368152" cy="923330"/>
+          <p:cNvPr id="15" name="Rectangle 14"/>
+          <p:cNvSpPr/>
+          <p:nvPr/>
+        </p:nvSpPr>
+        <p:spPr>
+          <a:xfrm>
+            <a:off x="3923928" y="2636912"/>
+            <a:ext cx="1728192" cy="864096"/>
           </a:xfrm>
           <a:prstGeom prst="rect">
             <a:avLst/>
           </a:prstGeom>
           <a:noFill/>
-        </p:spPr>
-        <p:txBody>
-          <a:bodyPr wrap="square" rtlCol="0">
-            <a:spAutoFit/>
-          </a:bodyPr>
-          <a:lstStyle/>
-          <a:p>
-            <a:r>
-              <a:rPr lang="en-GB" dirty="0" err="1" smtClean="0"/>
-              <a:t>Pathing</a:t>
-            </a:r>
-            <a:r>
-              <a:rPr lang="en-GB" dirty="0" smtClean="0"/>
-              <a:t> increases at O(N)</a:t>
-            </a:r>
-            <a:endParaRPr lang="en-GB" dirty="0"/>
+          <a:ln>
+            <a:solidFill>
+              <a:srgbClr val="FF0000"/>
+            </a:solidFill>
+          </a:ln>
+        </p:spPr>
+        <p:style>
+          <a:lnRef idx="2">
+            <a:schemeClr val="accent1">
+              <a:shade val="50000"/>
+            </a:schemeClr>
+          </a:lnRef>
+          <a:fillRef idx="1">
+            <a:schemeClr val="accent1"/>
+          </a:fillRef>
+          <a:effectRef idx="0">
+            <a:schemeClr val="accent1"/>
+          </a:effectRef>
+          <a:fontRef idx="minor">
+            <a:schemeClr val="lt1"/>
+          </a:fontRef>
+        </p:style>
+        <p:txBody>
+          <a:bodyPr rtlCol="0" anchor="ctr"/>
+          <a:lstStyle/>
+          <a:p>
+            <a:pPr algn="ctr"/>
+            <a:r>
+              <a:rPr lang="en-GB" dirty="0" smtClean="0">
+                <a:solidFill>
+                  <a:srgbClr val="FF0000"/>
+                </a:solidFill>
+              </a:rPr>
+              <a:t>Double map size results in ≈4 times lower FPS</a:t>
+            </a:r>
+            <a:endParaRPr lang="en-GB" dirty="0">
+              <a:solidFill>
+                <a:srgbClr val="FF0000"/>
+              </a:solidFill>
+            </a:endParaRPr>
           </a:p>
         </p:txBody>
       </p:sp>
@@ -4267,6 +5389,316 @@
   <p:clrMapOvr>
     <a:masterClrMapping/>
   </p:clrMapOvr>
+  <p:timing>
+    <p:tnLst>
+      <p:par>
+        <p:cTn id="1" dur="indefinite" restart="never" nodeType="tmRoot"/>
+      </p:par>
+    </p:tnLst>
+  </p:timing>
+</p:sld>
+</file>
+
+<file path=ppt/slides/slide17.xml><?xml version="1.0" encoding="utf-8"?>
+<p:sld xmlns:a="http://schemas.openxmlformats.org/drawingml/2006/main" xmlns:r="http://schemas.openxmlformats.org/officeDocument/2006/relationships" xmlns:p="http://schemas.openxmlformats.org/presentationml/2006/main">
+  <p:cSld>
+    <p:spTree>
+      <p:nvGrpSpPr>
+        <p:cNvPr id="1" name=""/>
+        <p:cNvGrpSpPr/>
+        <p:nvPr/>
+      </p:nvGrpSpPr>
+      <p:grpSpPr>
+        <a:xfrm>
+          <a:off x="0" y="0"/>
+          <a:ext cx="0" cy="0"/>
+          <a:chOff x="0" y="0"/>
+          <a:chExt cx="0" cy="0"/>
+        </a:xfrm>
+      </p:grpSpPr>
+      <p:sp>
+        <p:nvSpPr>
+          <p:cNvPr id="2" name="Title 1"/>
+          <p:cNvSpPr>
+            <a:spLocks noGrp="1"/>
+          </p:cNvSpPr>
+          <p:nvPr>
+            <p:ph type="title"/>
+          </p:nvPr>
+        </p:nvSpPr>
+        <p:spPr/>
+        <p:txBody>
+          <a:bodyPr/>
+          <a:lstStyle/>
+          <a:p>
+            <a:r>
+              <a:rPr lang="en-GB" dirty="0" smtClean="0"/>
+              <a:t>How well does this scale </a:t>
+            </a:r>
+            <a:r>
+              <a:rPr lang="en-GB" dirty="0" smtClean="0"/>
+              <a:t>3</a:t>
+            </a:r>
+            <a:endParaRPr lang="en-GB" dirty="0"/>
+          </a:p>
+        </p:txBody>
+      </p:sp>
+      <p:pic>
+        <p:nvPicPr>
+          <p:cNvPr id="30722" name="Picture 2"/>
+          <p:cNvPicPr>
+            <a:picLocks noGrp="1" noChangeAspect="1" noChangeArrowheads="1"/>
+          </p:cNvPicPr>
+          <p:nvPr>
+            <p:ph idx="1"/>
+          </p:nvPr>
+        </p:nvPicPr>
+        <p:blipFill>
+          <a:blip r:embed="rId2" cstate="print"/>
+          <a:srcRect/>
+          <a:stretch>
+            <a:fillRect/>
+          </a:stretch>
+        </p:blipFill>
+        <p:spPr bwMode="auto">
+          <a:xfrm>
+            <a:off x="467544" y="2132856"/>
+            <a:ext cx="8229600" cy="4337434"/>
+          </a:xfrm>
+          <a:prstGeom prst="rect">
+            <a:avLst/>
+          </a:prstGeom>
+          <a:noFill/>
+          <a:ln w="9525">
+            <a:noFill/>
+            <a:miter lim="800000"/>
+            <a:headEnd/>
+            <a:tailEnd/>
+          </a:ln>
+          <a:effectLst/>
+        </p:spPr>
+      </p:pic>
+      <p:sp>
+        <p:nvSpPr>
+          <p:cNvPr id="12" name="Rectangle 11"/>
+          <p:cNvSpPr/>
+          <p:nvPr/>
+        </p:nvSpPr>
+        <p:spPr>
+          <a:xfrm>
+            <a:off x="395536" y="1268760"/>
+            <a:ext cx="8064896" cy="738664"/>
+          </a:xfrm>
+          <a:prstGeom prst="rect">
+            <a:avLst/>
+          </a:prstGeom>
+        </p:spPr>
+        <p:txBody>
+          <a:bodyPr wrap="square">
+            <a:spAutoFit/>
+          </a:bodyPr>
+          <a:lstStyle/>
+          <a:p>
+            <a:pPr>
+              <a:buFont typeface="Arial" pitchFamily="34" charset="0"/>
+              <a:buChar char="•"/>
+            </a:pPr>
+            <a:r>
+              <a:rPr lang="pt-BR" sz="1400" dirty="0" smtClean="0"/>
+              <a:t> No clear O(N) effect observed</a:t>
+            </a:r>
+          </a:p>
+          <a:p>
+            <a:pPr lvl="1">
+              <a:buFont typeface="Arial" pitchFamily="34" charset="0"/>
+              <a:buChar char="•"/>
+            </a:pPr>
+            <a:r>
+              <a:rPr lang="pt-BR" sz="1400" dirty="0" smtClean="0"/>
+              <a:t>Noise too great</a:t>
+            </a:r>
+          </a:p>
+          <a:p>
+            <a:pPr lvl="1">
+              <a:buFont typeface="Arial" pitchFamily="34" charset="0"/>
+              <a:buChar char="•"/>
+            </a:pPr>
+            <a:r>
+              <a:rPr lang="pt-BR" sz="1400" dirty="0" smtClean="0"/>
+              <a:t>Change is not statistically mearuables</a:t>
+            </a:r>
+            <a:endParaRPr lang="en-GB" sz="1400" dirty="0"/>
+          </a:p>
+        </p:txBody>
+      </p:sp>
+    </p:spTree>
+  </p:cSld>
+  <p:clrMapOvr>
+    <a:masterClrMapping/>
+  </p:clrMapOvr>
+</p:sld>
+</file>
+
+<file path=ppt/slides/slide18.xml><?xml version="1.0" encoding="utf-8"?>
+<p:sld xmlns:a="http://schemas.openxmlformats.org/drawingml/2006/main" xmlns:r="http://schemas.openxmlformats.org/officeDocument/2006/relationships" xmlns:p="http://schemas.openxmlformats.org/presentationml/2006/main">
+  <p:cSld>
+    <p:spTree>
+      <p:nvGrpSpPr>
+        <p:cNvPr id="1" name=""/>
+        <p:cNvGrpSpPr/>
+        <p:nvPr/>
+      </p:nvGrpSpPr>
+      <p:grpSpPr>
+        <a:xfrm>
+          <a:off x="0" y="0"/>
+          <a:ext cx="0" cy="0"/>
+          <a:chOff x="0" y="0"/>
+          <a:chExt cx="0" cy="0"/>
+        </a:xfrm>
+      </p:grpSpPr>
+      <p:sp>
+        <p:nvSpPr>
+          <p:cNvPr id="2" name="Title 1"/>
+          <p:cNvSpPr>
+            <a:spLocks noGrp="1"/>
+          </p:cNvSpPr>
+          <p:nvPr>
+            <p:ph type="title"/>
+          </p:nvPr>
+        </p:nvSpPr>
+        <p:spPr/>
+        <p:txBody>
+          <a:bodyPr/>
+          <a:lstStyle/>
+          <a:p>
+            <a:r>
+              <a:rPr lang="en-GB" dirty="0" smtClean="0"/>
+              <a:t>Thank you</a:t>
+            </a:r>
+            <a:endParaRPr lang="en-GB" dirty="0"/>
+          </a:p>
+        </p:txBody>
+      </p:sp>
+      <p:pic>
+        <p:nvPicPr>
+          <p:cNvPr id="1026" name="Picture 2"/>
+          <p:cNvPicPr>
+            <a:picLocks noGrp="1" noChangeAspect="1" noChangeArrowheads="1"/>
+          </p:cNvPicPr>
+          <p:nvPr>
+            <p:ph idx="1"/>
+          </p:nvPr>
+        </p:nvPicPr>
+        <p:blipFill>
+          <a:blip r:embed="rId2" cstate="print"/>
+          <a:srcRect/>
+          <a:stretch>
+            <a:fillRect/>
+          </a:stretch>
+        </p:blipFill>
+        <p:spPr bwMode="auto">
+          <a:xfrm>
+            <a:off x="1304973" y="1600200"/>
+            <a:ext cx="6534054" cy="4525963"/>
+          </a:xfrm>
+          <a:prstGeom prst="rect">
+            <a:avLst/>
+          </a:prstGeom>
+          <a:noFill/>
+          <a:ln w="9525">
+            <a:noFill/>
+            <a:miter lim="800000"/>
+            <a:headEnd/>
+            <a:tailEnd/>
+          </a:ln>
+        </p:spPr>
+      </p:pic>
+      <p:sp>
+        <p:nvSpPr>
+          <p:cNvPr id="5" name="Title 1"/>
+          <p:cNvSpPr txBox="1">
+            <a:spLocks/>
+          </p:cNvSpPr>
+          <p:nvPr/>
+        </p:nvSpPr>
+        <p:spPr>
+          <a:xfrm>
+            <a:off x="1331640" y="1628800"/>
+            <a:ext cx="6480720" cy="4536504"/>
+          </a:xfrm>
+          <a:prstGeom prst="rect">
+            <a:avLst/>
+          </a:prstGeom>
+        </p:spPr>
+        <p:txBody>
+          <a:bodyPr vert="horz" lIns="91440" tIns="45720" rIns="91440" bIns="45720" rtlCol="0" anchor="ctr">
+            <a:normAutofit/>
+          </a:bodyPr>
+          <a:lstStyle/>
+          <a:p>
+            <a:pPr marL="0" marR="0" lvl="0" indent="0" algn="ctr" defTabSz="914400" rtl="0" eaLnBrk="1" fontAlgn="auto" latinLnBrk="0" hangingPunct="1">
+              <a:lnSpc>
+                <a:spcPct val="100000"/>
+              </a:lnSpc>
+              <a:spcBef>
+                <a:spcPct val="0"/>
+              </a:spcBef>
+              <a:spcAft>
+                <a:spcPts val="0"/>
+              </a:spcAft>
+              <a:buClrTx/>
+              <a:buSzTx/>
+              <a:buFontTx/>
+              <a:buNone/>
+              <a:tabLst/>
+              <a:defRPr/>
+            </a:pPr>
+            <a:r>
+              <a:rPr kumimoji="0" lang="en-GB" sz="4400" b="0" i="0" u="none" strike="noStrike" kern="1200" cap="none" spc="0" normalizeH="0" baseline="0" noProof="0" dirty="0" smtClean="0">
+                <a:ln>
+                  <a:noFill/>
+                </a:ln>
+                <a:solidFill>
+                  <a:schemeClr val="tx1"/>
+                </a:solidFill>
+                <a:effectLst/>
+                <a:uLnTx/>
+                <a:uFillTx/>
+                <a:latin typeface="+mj-lt"/>
+                <a:ea typeface="+mj-ea"/>
+                <a:cs typeface="+mj-cs"/>
+              </a:rPr>
+              <a:t>Questions?</a:t>
+            </a:r>
+            <a:endParaRPr kumimoji="0" lang="en-GB" sz="4400" b="0" i="0" u="none" strike="noStrike" kern="1200" cap="none" spc="0" normalizeH="0" baseline="0" noProof="0" dirty="0">
+              <a:ln>
+                <a:noFill/>
+              </a:ln>
+              <a:solidFill>
+                <a:schemeClr val="tx1"/>
+              </a:solidFill>
+              <a:effectLst/>
+              <a:uLnTx/>
+              <a:uFillTx/>
+              <a:latin typeface="+mj-lt"/>
+              <a:ea typeface="+mj-ea"/>
+              <a:cs typeface="+mj-cs"/>
+            </a:endParaRPr>
+          </a:p>
+        </p:txBody>
+      </p:sp>
+    </p:spTree>
+  </p:cSld>
+  <p:clrMapOvr>
+    <a:masterClrMapping/>
+  </p:clrMapOvr>
+  <p:timing>
+    <p:tnLst>
+      <p:par>
+        <p:cTn id="1" dur="indefinite" restart="never" nodeType="tmRoot"/>
+      </p:par>
+    </p:tnLst>
+  </p:timing>
 </p:sld>
 </file>
 
@@ -4772,7 +6204,11 @@
             </a:r>
             <a:r>
               <a:rPr lang="en-GB" dirty="0" smtClean="0"/>
-              <a:t> Threads</a:t>
+              <a:t> </a:t>
+            </a:r>
+            <a:r>
+              <a:rPr lang="en-GB" dirty="0" smtClean="0"/>
+              <a:t>Threads</a:t>
             </a:r>
             <a:endParaRPr lang="en-GB" dirty="0"/>
           </a:p>
@@ -4802,13 +6238,29 @@
           <a:p>
             <a:r>
               <a:rPr lang="en-GB" sz="1900" dirty="0" smtClean="0"/>
-              <a:t>Each frame is staged using barriers with a min of four threads</a:t>
-            </a:r>
-          </a:p>
-          <a:p>
+              <a:t>Each frame is staged using barriers with a </a:t>
+            </a:r>
             <a:r>
               <a:rPr lang="en-GB" sz="1900" dirty="0" smtClean="0"/>
-              <a:t>Game Objects and Path Finding threads numbers can be varied.</a:t>
+              <a:t>minimum </a:t>
+            </a:r>
+            <a:r>
+              <a:rPr lang="en-GB" sz="1900" dirty="0" smtClean="0"/>
+              <a:t>of four threads</a:t>
+            </a:r>
+          </a:p>
+          <a:p>
+            <a:r>
+              <a:rPr lang="en-GB" sz="1900" dirty="0" err="1" smtClean="0"/>
+              <a:t>GameObjects</a:t>
+            </a:r>
+            <a:r>
+              <a:rPr lang="en-GB" sz="1900" dirty="0" smtClean="0"/>
+              <a:t> </a:t>
+            </a:r>
+            <a:r>
+              <a:rPr lang="en-GB" sz="1900" dirty="0" smtClean="0"/>
+              <a:t>and Path Finding threads numbers can be varied.</a:t>
             </a:r>
           </a:p>
           <a:p>
@@ -6250,7 +7702,15 @@
           <a:p>
             <a:r>
               <a:rPr lang="en-GB" dirty="0" smtClean="0"/>
-              <a:t>Object manages list of ‘live’ objects – Managed through creating task list.</a:t>
+              <a:t>Object </a:t>
+            </a:r>
+            <a:r>
+              <a:rPr lang="en-GB" dirty="0" smtClean="0"/>
+              <a:t>manages </a:t>
+            </a:r>
+            <a:r>
+              <a:rPr lang="en-GB" dirty="0" smtClean="0"/>
+              <a:t>list of ‘live’ objects – Managed through creating task list.</a:t>
             </a:r>
           </a:p>
           <a:p>
@@ -7172,41 +8632,6 @@
           </a:p>
         </p:txBody>
       </p:sp>
-      <p:pic>
-        <p:nvPicPr>
-          <p:cNvPr id="1026" name="Picture 2"/>
-          <p:cNvPicPr>
-            <a:picLocks noGrp="1" noChangeAspect="1" noChangeArrowheads="1"/>
-          </p:cNvPicPr>
-          <p:nvPr>
-            <p:ph idx="1"/>
-          </p:nvPr>
-        </p:nvPicPr>
-        <p:blipFill>
-          <a:blip r:embed="rId2" cstate="print"/>
-          <a:srcRect/>
-          <a:stretch>
-            <a:fillRect/>
-          </a:stretch>
-        </p:blipFill>
-        <p:spPr bwMode="auto">
-          <a:xfrm>
-            <a:off x="683568" y="2276872"/>
-            <a:ext cx="7797460" cy="3981033"/>
-          </a:xfrm>
-          <a:prstGeom prst="rect">
-            <a:avLst/>
-          </a:prstGeom>
-          <a:noFill/>
-          <a:ln w="9525">
-            <a:noFill/>
-            <a:miter lim="800000"/>
-            <a:headEnd/>
-            <a:tailEnd/>
-          </a:ln>
-          <a:effectLst/>
-        </p:spPr>
-      </p:pic>
       <p:sp>
         <p:nvSpPr>
           <p:cNvPr id="5" name="TextBox 4"/>
@@ -7216,7 +8641,7 @@
         <p:spPr>
           <a:xfrm>
             <a:off x="683568" y="1340768"/>
-            <a:ext cx="7776864" cy="830997"/>
+            <a:ext cx="7776864" cy="584775"/>
           </a:xfrm>
           <a:prstGeom prst="rect">
             <a:avLst/>
@@ -7245,67 +8670,110 @@
             </a:pPr>
             <a:r>
               <a:rPr lang="pt-BR" sz="1600" dirty="0" smtClean="0"/>
-              <a:t> 6/8 threads produces optimum performance</a:t>
-            </a:r>
-          </a:p>
-          <a:p>
-            <a:pPr>
-              <a:buFont typeface="Arial" pitchFamily="34" charset="0"/>
-              <a:buChar char="•"/>
-            </a:pPr>
+              <a:t> 6/8 threads produces optimum </a:t>
+            </a:r>
             <a:r>
               <a:rPr lang="pt-BR" sz="1600" dirty="0" smtClean="0"/>
-              <a:t> Hence 1 main thread, 1 renedr thread and a combination of 6 pathing and update threads.</a:t>
-            </a:r>
-          </a:p>
-        </p:txBody>
-      </p:sp>
-      <p:sp>
-        <p:nvSpPr>
-          <p:cNvPr id="6" name="Oval 5"/>
-          <p:cNvSpPr/>
-          <p:nvPr/>
-        </p:nvSpPr>
-        <p:spPr>
-          <a:xfrm>
-            <a:off x="2699792" y="2780928"/>
-            <a:ext cx="864096" cy="576064"/>
-          </a:xfrm>
-          <a:prstGeom prst="ellipse">
-            <a:avLst/>
-          </a:prstGeom>
-          <a:noFill/>
-          <a:ln>
-            <a:solidFill>
-              <a:srgbClr val="FF0000"/>
-            </a:solidFill>
-          </a:ln>
-        </p:spPr>
-        <p:style>
-          <a:lnRef idx="2">
-            <a:schemeClr val="accent1">
-              <a:shade val="50000"/>
-            </a:schemeClr>
-          </a:lnRef>
-          <a:fillRef idx="1">
-            <a:schemeClr val="accent1"/>
-          </a:fillRef>
-          <a:effectRef idx="0">
-            <a:schemeClr val="accent1"/>
-          </a:effectRef>
-          <a:fontRef idx="minor">
-            <a:schemeClr val="lt1"/>
-          </a:fontRef>
-        </p:style>
-        <p:txBody>
-          <a:bodyPr rtlCol="0" anchor="ctr"/>
-          <a:lstStyle/>
-          <a:p>
-            <a:pPr algn="ctr"/>
-            <a:endParaRPr lang="en-GB"/>
-          </a:p>
-        </p:txBody>
-      </p:sp>
+              <a:t>performance</a:t>
+            </a:r>
+            <a:endParaRPr lang="pt-BR" sz="1600" dirty="0" smtClean="0"/>
+          </a:p>
+        </p:txBody>
+      </p:sp>
+      <p:grpSp>
+        <p:nvGrpSpPr>
+          <p:cNvPr id="13" name="Group 12"/>
+          <p:cNvGrpSpPr/>
+          <p:nvPr/>
+        </p:nvGrpSpPr>
+        <p:grpSpPr>
+          <a:xfrm>
+            <a:off x="1403648" y="2420888"/>
+            <a:ext cx="6142072" cy="3778776"/>
+            <a:chOff x="1428956" y="2530544"/>
+            <a:chExt cx="6142072" cy="3778776"/>
+          </a:xfrm>
+        </p:grpSpPr>
+        <p:pic>
+          <p:nvPicPr>
+            <p:cNvPr id="12" name="Picture 11"/>
+            <p:cNvPicPr>
+              <a:picLocks noChangeAspect="1" noChangeArrowheads="1"/>
+            </p:cNvPicPr>
+            <p:nvPr/>
+          </p:nvPicPr>
+          <p:blipFill>
+            <a:blip r:embed="rId2" cstate="print"/>
+            <a:srcRect/>
+            <a:stretch>
+              <a:fillRect/>
+            </a:stretch>
+          </p:blipFill>
+          <p:spPr bwMode="auto">
+            <a:xfrm>
+              <a:off x="1428956" y="2530544"/>
+              <a:ext cx="6142072" cy="3778776"/>
+            </a:xfrm>
+            <a:prstGeom prst="rect">
+              <a:avLst/>
+            </a:prstGeom>
+            <a:noFill/>
+            <a:ln w="9525">
+              <a:noFill/>
+              <a:miter lim="800000"/>
+              <a:headEnd/>
+              <a:tailEnd/>
+            </a:ln>
+            <a:effectLst/>
+          </p:spPr>
+        </p:pic>
+        <p:sp>
+          <p:nvSpPr>
+            <p:cNvPr id="6" name="Oval 5"/>
+            <p:cNvSpPr/>
+            <p:nvPr/>
+          </p:nvSpPr>
+          <p:spPr>
+            <a:xfrm>
+              <a:off x="2915816" y="3645024"/>
+              <a:ext cx="864096" cy="576064"/>
+            </a:xfrm>
+            <a:prstGeom prst="ellipse">
+              <a:avLst/>
+            </a:prstGeom>
+            <a:noFill/>
+            <a:ln>
+              <a:solidFill>
+                <a:srgbClr val="FF0000"/>
+              </a:solidFill>
+            </a:ln>
+          </p:spPr>
+          <p:style>
+            <a:lnRef idx="2">
+              <a:schemeClr val="accent1">
+                <a:shade val="50000"/>
+              </a:schemeClr>
+            </a:lnRef>
+            <a:fillRef idx="1">
+              <a:schemeClr val="accent1"/>
+            </a:fillRef>
+            <a:effectRef idx="0">
+              <a:schemeClr val="accent1"/>
+            </a:effectRef>
+            <a:fontRef idx="minor">
+              <a:schemeClr val="lt1"/>
+            </a:fontRef>
+          </p:style>
+          <p:txBody>
+            <a:bodyPr rtlCol="0" anchor="ctr"/>
+            <a:lstStyle/>
+            <a:p>
+              <a:pPr algn="ctr"/>
+              <a:endParaRPr lang="en-GB"/>
+            </a:p>
+          </p:txBody>
+        </p:sp>
+      </p:grpSp>
     </p:spTree>
   </p:cSld>
   <p:clrMapOvr>
@@ -7354,35 +8822,115 @@
           <a:lstStyle/>
           <a:p>
             <a:r>
-              <a:rPr lang="en-GB" dirty="0" err="1" smtClean="0"/>
-              <a:t>Pathing</a:t>
-            </a:r>
-            <a:r>
-              <a:rPr lang="en-GB" dirty="0" smtClean="0"/>
-              <a:t> Verses FPS</a:t>
+              <a:rPr lang="en-GB" dirty="0" smtClean="0"/>
+              <a:t>Initial Performance Assessment </a:t>
+            </a:r>
+            <a:r>
+              <a:rPr lang="en-GB" dirty="0" smtClean="0"/>
+              <a:t>2</a:t>
             </a:r>
             <a:endParaRPr lang="en-GB" dirty="0"/>
           </a:p>
         </p:txBody>
       </p:sp>
-      <p:sp>
-        <p:nvSpPr>
-          <p:cNvPr id="11" name="TextBox 10"/>
-          <p:cNvSpPr txBox="1"/>
-          <p:nvPr/>
-        </p:nvSpPr>
-        <p:spPr>
-          <a:xfrm>
-            <a:off x="683568" y="1412776"/>
-            <a:ext cx="7776864" cy="584775"/>
+      <p:pic>
+        <p:nvPicPr>
+          <p:cNvPr id="4" name="Content Placeholder 3"/>
+          <p:cNvPicPr>
+            <a:picLocks noGrp="1" noChangeAspect="1" noChangeArrowheads="1"/>
+          </p:cNvPicPr>
+          <p:nvPr>
+            <p:ph idx="1"/>
+          </p:nvPr>
+        </p:nvPicPr>
+        <p:blipFill>
+          <a:blip r:embed="rId2" cstate="print"/>
+          <a:srcRect/>
+          <a:stretch>
+            <a:fillRect/>
+          </a:stretch>
+        </p:blipFill>
+        <p:spPr bwMode="auto">
+          <a:xfrm>
+            <a:off x="827584" y="2132856"/>
+            <a:ext cx="7574540" cy="4137238"/>
           </a:xfrm>
           <a:prstGeom prst="rect">
             <a:avLst/>
           </a:prstGeom>
           <a:noFill/>
-        </p:spPr>
-        <p:txBody>
-          <a:bodyPr wrap="square" rtlCol="0">
+          <a:ln w="9525">
+            <a:noFill/>
+            <a:miter lim="800000"/>
+            <a:headEnd/>
+            <a:tailEnd/>
+          </a:ln>
+          <a:effectLst/>
+        </p:spPr>
+      </p:pic>
+      <p:sp>
+        <p:nvSpPr>
+          <p:cNvPr id="5" name="Oval 4"/>
+          <p:cNvSpPr/>
+          <p:nvPr/>
+        </p:nvSpPr>
+        <p:spPr>
+          <a:xfrm>
+            <a:off x="2915816" y="5445224"/>
+            <a:ext cx="576064" cy="576064"/>
+          </a:xfrm>
+          <a:prstGeom prst="ellipse">
+            <a:avLst/>
+          </a:prstGeom>
+          <a:noFill/>
+          <a:ln>
+            <a:solidFill>
+              <a:srgbClr val="FF0000"/>
+            </a:solidFill>
+          </a:ln>
+        </p:spPr>
+        <p:style>
+          <a:lnRef idx="2">
+            <a:schemeClr val="accent1">
+              <a:shade val="50000"/>
+            </a:schemeClr>
+          </a:lnRef>
+          <a:fillRef idx="1">
+            <a:schemeClr val="accent1"/>
+          </a:fillRef>
+          <a:effectRef idx="0">
+            <a:schemeClr val="accent1"/>
+          </a:effectRef>
+          <a:fontRef idx="minor">
+            <a:schemeClr val="lt1"/>
+          </a:fontRef>
+        </p:style>
+        <p:txBody>
+          <a:bodyPr rtlCol="0" anchor="ctr"/>
+          <a:lstStyle/>
+          <a:p>
+            <a:pPr algn="ctr"/>
+            <a:endParaRPr lang="en-GB"/>
+          </a:p>
+        </p:txBody>
+      </p:sp>
+      <p:sp>
+        <p:nvSpPr>
+          <p:cNvPr id="6" name="Rectangle 5"/>
+          <p:cNvSpPr/>
+          <p:nvPr/>
+        </p:nvSpPr>
+        <p:spPr>
+          <a:xfrm>
+            <a:off x="755576" y="1340768"/>
+            <a:ext cx="7776864" cy="615553"/>
+          </a:xfrm>
+          <a:prstGeom prst="rect">
+            <a:avLst/>
+          </a:prstGeom>
+        </p:spPr>
+        <p:txBody>
+          <a:bodyPr wrap="square">
             <a:spAutoFit/>
           </a:bodyPr>
           <a:lstStyle/>
@@ -7393,7 +8941,7 @@
             </a:pPr>
             <a:r>
               <a:rPr lang="pt-BR" sz="1600" dirty="0" smtClean="0"/>
-              <a:t> Trade off between Units time to getting paths and achieveing the max possible frame rates</a:t>
+              <a:t> This conclusion is comfimed looking at the box plot data. </a:t>
             </a:r>
           </a:p>
           <a:p>
@@ -7403,204 +8951,32 @@
             </a:pPr>
             <a:r>
               <a:rPr lang="pt-BR" sz="1600" dirty="0" smtClean="0"/>
-              <a:t> Significant penatlty for relying on one thread for pathfiding but not for updating units</a:t>
-            </a:r>
-          </a:p>
-        </p:txBody>
-      </p:sp>
-      <p:grpSp>
-        <p:nvGrpSpPr>
-          <p:cNvPr id="15" name="Group 14"/>
-          <p:cNvGrpSpPr/>
-          <p:nvPr/>
-        </p:nvGrpSpPr>
-        <p:grpSpPr>
-          <a:xfrm>
-            <a:off x="1259632" y="2132856"/>
-            <a:ext cx="6768752" cy="4196261"/>
-            <a:chOff x="1259632" y="2204864"/>
-            <a:chExt cx="6768752" cy="4196261"/>
-          </a:xfrm>
-        </p:grpSpPr>
-        <p:grpSp>
-          <p:nvGrpSpPr>
-            <p:cNvPr id="10" name="Group 9"/>
-            <p:cNvGrpSpPr/>
-            <p:nvPr/>
-          </p:nvGrpSpPr>
-          <p:grpSpPr>
-            <a:xfrm>
-              <a:off x="1259632" y="2204864"/>
-              <a:ext cx="6768752" cy="4196261"/>
-              <a:chOff x="971600" y="2132856"/>
-              <a:chExt cx="6768752" cy="4196261"/>
-            </a:xfrm>
-          </p:grpSpPr>
-          <p:pic>
-            <p:nvPicPr>
-              <p:cNvPr id="2051" name="Picture 3"/>
-              <p:cNvPicPr>
-                <a:picLocks noChangeAspect="1" noChangeArrowheads="1"/>
-              </p:cNvPicPr>
-              <p:nvPr/>
-            </p:nvPicPr>
-            <p:blipFill>
-              <a:blip r:embed="rId2" cstate="print"/>
-              <a:srcRect/>
-              <a:stretch>
-                <a:fillRect/>
-              </a:stretch>
-            </p:blipFill>
-            <p:spPr bwMode="auto">
-              <a:xfrm>
-                <a:off x="971600" y="2132856"/>
-                <a:ext cx="6768752" cy="4196261"/>
-              </a:xfrm>
-              <a:prstGeom prst="rect">
-                <a:avLst/>
-              </a:prstGeom>
-              <a:noFill/>
-              <a:ln w="9525">
-                <a:noFill/>
-                <a:miter lim="800000"/>
-                <a:headEnd/>
-                <a:tailEnd/>
-              </a:ln>
-              <a:effectLst/>
-            </p:spPr>
-          </p:pic>
-          <p:sp>
-            <p:nvSpPr>
-              <p:cNvPr id="6" name="Oval 5"/>
-              <p:cNvSpPr/>
-              <p:nvPr/>
-            </p:nvSpPr>
-            <p:spPr>
-              <a:xfrm flipH="1">
-                <a:off x="3995936" y="2996952"/>
-                <a:ext cx="720080" cy="216024"/>
-              </a:xfrm>
-              <a:prstGeom prst="ellipse">
-                <a:avLst/>
-              </a:prstGeom>
-              <a:noFill/>
-              <a:ln>
-                <a:solidFill>
-                  <a:srgbClr val="FF0000"/>
-                </a:solidFill>
-              </a:ln>
-            </p:spPr>
-            <p:style>
-              <a:lnRef idx="2">
-                <a:schemeClr val="accent1">
-                  <a:shade val="50000"/>
-                </a:schemeClr>
-              </a:lnRef>
-              <a:fillRef idx="1">
-                <a:schemeClr val="accent1"/>
-              </a:fillRef>
-              <a:effectRef idx="0">
-                <a:schemeClr val="accent1"/>
-              </a:effectRef>
-              <a:fontRef idx="minor">
-                <a:schemeClr val="lt1"/>
-              </a:fontRef>
-            </p:style>
-            <p:txBody>
-              <a:bodyPr rtlCol="0" anchor="ctr"/>
-              <a:lstStyle/>
-              <a:p>
-                <a:pPr algn="ctr"/>
-                <a:endParaRPr lang="en-GB"/>
-              </a:p>
-            </p:txBody>
-          </p:sp>
-          <p:sp>
-            <p:nvSpPr>
-              <p:cNvPr id="9" name="Oval 8"/>
-              <p:cNvSpPr/>
-              <p:nvPr/>
-            </p:nvSpPr>
-            <p:spPr>
-              <a:xfrm flipH="1">
-                <a:off x="1907704" y="5445224"/>
-                <a:ext cx="720080" cy="216024"/>
-              </a:xfrm>
-              <a:prstGeom prst="ellipse">
-                <a:avLst/>
-              </a:prstGeom>
-              <a:noFill/>
-              <a:ln>
-                <a:solidFill>
-                  <a:srgbClr val="FF0000"/>
-                </a:solidFill>
-              </a:ln>
-            </p:spPr>
-            <p:style>
-              <a:lnRef idx="2">
-                <a:schemeClr val="accent1">
-                  <a:shade val="50000"/>
-                </a:schemeClr>
-              </a:lnRef>
-              <a:fillRef idx="1">
-                <a:schemeClr val="accent1"/>
-              </a:fillRef>
-              <a:effectRef idx="0">
-                <a:schemeClr val="accent1"/>
-              </a:effectRef>
-              <a:fontRef idx="minor">
-                <a:schemeClr val="lt1"/>
-              </a:fontRef>
-            </p:style>
-            <p:txBody>
-              <a:bodyPr rtlCol="0" anchor="ctr"/>
-              <a:lstStyle/>
-              <a:p>
-                <a:pPr algn="ctr"/>
-                <a:endParaRPr lang="en-GB"/>
-              </a:p>
-            </p:txBody>
-          </p:sp>
-        </p:grpSp>
-        <p:sp>
-          <p:nvSpPr>
-            <p:cNvPr id="14" name="Rectangle 13"/>
-            <p:cNvSpPr/>
-            <p:nvPr/>
-          </p:nvSpPr>
-          <p:spPr>
-            <a:xfrm>
-              <a:off x="6300192" y="5229200"/>
-              <a:ext cx="926857" cy="369332"/>
-            </a:xfrm>
-            <a:prstGeom prst="rect">
-              <a:avLst/>
-            </a:prstGeom>
-          </p:spPr>
-          <p:txBody>
-            <a:bodyPr wrap="none">
-              <a:spAutoFit/>
-            </a:bodyPr>
-            <a:lstStyle/>
-            <a:p>
-              <a:r>
-                <a:rPr lang="en-GB" dirty="0" smtClean="0">
-                  <a:solidFill>
-                    <a:srgbClr val="000000"/>
-                  </a:solidFill>
-                </a:rPr>
-                <a:t>3190ms</a:t>
-              </a:r>
-              <a:endParaRPr lang="en-GB" dirty="0"/>
-            </a:p>
-          </p:txBody>
-        </p:sp>
-      </p:grpSp>
+              <a:t> Hence </a:t>
+            </a:r>
+            <a:r>
+              <a:rPr lang="pt-BR" sz="1600" dirty="0" smtClean="0"/>
+              <a:t>1 main thread, 1 renedr thread and a combination of 6 pathing and update threads</a:t>
+            </a:r>
+            <a:r>
+              <a:rPr lang="pt-BR" dirty="0" smtClean="0"/>
+              <a:t>.</a:t>
+            </a:r>
+            <a:endParaRPr lang="en-GB" dirty="0"/>
+          </a:p>
+        </p:txBody>
+      </p:sp>
     </p:spTree>
   </p:cSld>
   <p:clrMapOvr>
     <a:masterClrMapping/>
   </p:clrMapOvr>
+  <p:timing>
+    <p:tnLst>
+      <p:par>
+        <p:cTn id="1" dur="indefinite" restart="never" nodeType="tmRoot"/>
+      </p:par>
+    </p:tnLst>
+  </p:timing>
 </p:sld>
 </file>
 

</xml_diff>